<commit_message>
update: modify report for final public
</commit_message>
<xml_diff>
--- a/report/200626_AI.pptx
+++ b/report/200626_AI.pptx
@@ -5,10 +5,10 @@
     <p:sldMasterId id="2147483648" r:id="rId1"/>
   </p:sldMasterIdLst>
   <p:notesMasterIdLst>
-    <p:notesMasterId r:id="rId13"/>
+    <p:notesMasterId r:id="rId17"/>
   </p:notesMasterIdLst>
   <p:handoutMasterIdLst>
-    <p:handoutMasterId r:id="rId14"/>
+    <p:handoutMasterId r:id="rId18"/>
   </p:handoutMasterIdLst>
   <p:sldIdLst>
     <p:sldId id="256" r:id="rId2"/>
@@ -20,8 +20,12 @@
     <p:sldId id="358" r:id="rId8"/>
     <p:sldId id="359" r:id="rId9"/>
     <p:sldId id="360" r:id="rId10"/>
-    <p:sldId id="361" r:id="rId11"/>
-    <p:sldId id="339" r:id="rId12"/>
+    <p:sldId id="362" r:id="rId11"/>
+    <p:sldId id="363" r:id="rId12"/>
+    <p:sldId id="364" r:id="rId13"/>
+    <p:sldId id="365" r:id="rId14"/>
+    <p:sldId id="361" r:id="rId15"/>
+    <p:sldId id="339" r:id="rId16"/>
   </p:sldIdLst>
   <p:sldSz cx="13004800" cy="9753600"/>
   <p:notesSz cx="6797675" cy="9929813"/>
@@ -413,7 +417,7 @@
           <a:p>
             <a:fld id="{654D9611-E584-4159-9E45-463C4283EFF5}" type="datetimeFigureOut">
               <a:rPr lang="ko-KR" altLang="en-US" smtClean="0"/>
-              <a:t>2020-06-25</a:t>
+              <a:t>2020-06-26</a:t>
             </a:fld>
             <a:endParaRPr lang="ko-KR" altLang="en-US"/>
           </a:p>
@@ -1476,7 +1480,7 @@
           </a:ln>
           <a:extLst>
             <a:ext uri="{C572A759-6A51-4108-AA02-DFA0A04FC94B}">
-              <ma14:wrappingTextBoxFlag xmlns:ma14="http://schemas.microsoft.com/office/mac/drawingml/2011/main" xmlns:a14="http://schemas.microsoft.com/office/drawing/2010/main" xmlns:m="http://schemas.openxmlformats.org/officeDocument/2006/math" xmlns="" val="1"/>
+              <ma14:wrappingTextBoxFlag xmlns="" xmlns:m="http://schemas.openxmlformats.org/officeDocument/2006/math" xmlns:a14="http://schemas.microsoft.com/office/drawing/2010/main" xmlns:ma14="http://schemas.microsoft.com/office/mac/drawingml/2011/main" val="1"/>
             </a:ext>
           </a:extLst>
         </p:spPr>
@@ -2145,7 +2149,7 @@
           </a:ln>
           <a:extLst>
             <a:ext uri="{C572A759-6A51-4108-AA02-DFA0A04FC94B}">
-              <ma14:wrappingTextBoxFlag xmlns:ma14="http://schemas.microsoft.com/office/mac/drawingml/2011/main" xmlns:a14="http://schemas.microsoft.com/office/drawing/2010/main" xmlns:m="http://schemas.openxmlformats.org/officeDocument/2006/math" xmlns="" val="1"/>
+              <ma14:wrappingTextBoxFlag xmlns="" xmlns:m="http://schemas.openxmlformats.org/officeDocument/2006/math" xmlns:a14="http://schemas.microsoft.com/office/drawing/2010/main" xmlns:ma14="http://schemas.microsoft.com/office/mac/drawingml/2011/main" val="1"/>
             </a:ext>
           </a:extLst>
         </p:spPr>
@@ -2383,7 +2387,7 @@
           </a:ln>
           <a:extLst>
             <a:ext uri="{C572A759-6A51-4108-AA02-DFA0A04FC94B}">
-              <ma14:wrappingTextBoxFlag xmlns:ma14="http://schemas.microsoft.com/office/mac/drawingml/2011/main" xmlns:a14="http://schemas.microsoft.com/office/drawing/2010/main" xmlns:m="http://schemas.openxmlformats.org/officeDocument/2006/math" xmlns="" val="1"/>
+              <ma14:wrappingTextBoxFlag xmlns="" xmlns:m="http://schemas.openxmlformats.org/officeDocument/2006/math" xmlns:a14="http://schemas.microsoft.com/office/drawing/2010/main" xmlns:ma14="http://schemas.microsoft.com/office/mac/drawingml/2011/main" val="1"/>
             </a:ext>
           </a:extLst>
         </p:spPr>
@@ -2525,7 +2529,7 @@
           </a:ln>
           <a:extLst>
             <a:ext uri="{C572A759-6A51-4108-AA02-DFA0A04FC94B}">
-              <ma14:wrappingTextBoxFlag xmlns:ma14="http://schemas.microsoft.com/office/mac/drawingml/2011/main" xmlns:a14="http://schemas.microsoft.com/office/drawing/2010/main" xmlns:m="http://schemas.openxmlformats.org/officeDocument/2006/math" xmlns="" val="1"/>
+              <ma14:wrappingTextBoxFlag xmlns="" xmlns:m="http://schemas.openxmlformats.org/officeDocument/2006/math" xmlns:a14="http://schemas.microsoft.com/office/drawing/2010/main" xmlns:ma14="http://schemas.microsoft.com/office/mac/drawingml/2011/main" val="1"/>
             </a:ext>
           </a:extLst>
         </p:spPr>
@@ -2564,7 +2568,7 @@
           </a:ln>
           <a:extLst>
             <a:ext uri="{C572A759-6A51-4108-AA02-DFA0A04FC94B}">
-              <ma14:wrappingTextBoxFlag xmlns:ma14="http://schemas.microsoft.com/office/mac/drawingml/2011/main" xmlns:a14="http://schemas.microsoft.com/office/drawing/2010/main" xmlns:m="http://schemas.openxmlformats.org/officeDocument/2006/math" xmlns="" val="1"/>
+              <ma14:wrappingTextBoxFlag xmlns="" xmlns:m="http://schemas.openxmlformats.org/officeDocument/2006/math" xmlns:a14="http://schemas.microsoft.com/office/drawing/2010/main" xmlns:ma14="http://schemas.microsoft.com/office/mac/drawingml/2011/main" val="1"/>
             </a:ext>
           </a:extLst>
         </p:spPr>
@@ -3664,22 +3668,14 @@
           <a:p>
             <a:pPr latinLnBrk="1"/>
             <a:r>
+              <a:rPr lang="en-US" altLang="ko-KR" dirty="0" err="1" smtClean="0"/>
+              <a:t>Kaggle</a:t>
+            </a:r>
+            <a:r>
               <a:rPr lang="en-US" altLang="ko-KR" dirty="0" smtClean="0"/>
-              <a:t>Patent Idea </a:t>
-            </a:r>
-            <a:r>
-              <a:rPr lang="en-US" altLang="ko-KR" dirty="0" smtClean="0">
-                <a:solidFill>
-                  <a:srgbClr val="FF0000"/>
-                </a:solidFill>
-              </a:rPr>
-              <a:t>(Not Publicly Available)</a:t>
-            </a:r>
-            <a:endParaRPr lang="ko-KR" altLang="ko-KR" dirty="0">
-              <a:solidFill>
-                <a:srgbClr val="FF0000"/>
-              </a:solidFill>
-            </a:endParaRPr>
+              <a:t> Competition</a:t>
+            </a:r>
+            <a:endParaRPr lang="ko-KR" altLang="ko-KR" dirty="0"/>
           </a:p>
         </p:txBody>
       </p:sp>
@@ -3695,25 +3691,145 @@
         </p:nvSpPr>
         <p:spPr>
           <a:xfrm>
-            <a:off x="673100" y="2479042"/>
-            <a:ext cx="11057983" cy="1000138"/>
+            <a:off x="695403" y="1836606"/>
+            <a:ext cx="11057983" cy="7017462"/>
           </a:xfrm>
           <a:prstGeom prst="rect">
             <a:avLst/>
           </a:prstGeom>
         </p:spPr>
         <p:txBody>
-          <a:bodyPr/>
+          <a:bodyPr>
+            <a:normAutofit/>
+          </a:bodyPr>
           <a:lstStyle/>
           <a:p>
             <a:pPr fontAlgn="base"/>
             <a:r>
               <a:rPr lang="en-US" altLang="ko-KR" dirty="0" smtClean="0">
                 <a:solidFill>
-                  <a:srgbClr val="FF0000"/>
-                </a:solidFill>
-              </a:rPr>
-              <a:t>NOT PUBLICLY AVAILABLE</a:t>
+                  <a:schemeClr val="tx1"/>
+                </a:solidFill>
+              </a:rPr>
+              <a:t>Don’t Get </a:t>
+            </a:r>
+            <a:r>
+              <a:rPr lang="en-US" altLang="ko-KR" dirty="0" smtClean="0">
+                <a:solidFill>
+                  <a:schemeClr val="tx1"/>
+                </a:solidFill>
+              </a:rPr>
+              <a:t>Kicked</a:t>
+            </a:r>
+          </a:p>
+          <a:p>
+            <a:pPr lvl="1" fontAlgn="base"/>
+            <a:r>
+              <a:rPr lang="ko-KR" altLang="en-US" dirty="0" smtClean="0">
+                <a:solidFill>
+                  <a:schemeClr val="tx1"/>
+                </a:solidFill>
+              </a:rPr>
+              <a:t>딥러닝 이용 </a:t>
+            </a:r>
+            <a:r>
+              <a:rPr lang="en-US" altLang="ko-KR" dirty="0" smtClean="0">
+                <a:solidFill>
+                  <a:schemeClr val="tx1"/>
+                </a:solidFill>
+              </a:rPr>
+              <a:t>(</a:t>
+            </a:r>
+            <a:r>
+              <a:rPr lang="ko-KR" altLang="en-US" dirty="0" smtClean="0">
+                <a:solidFill>
+                  <a:schemeClr val="tx1"/>
+                </a:solidFill>
+              </a:rPr>
+              <a:t>학습 및 테스트 데이터 열 지정 오류 수정 이후</a:t>
+            </a:r>
+            <a:r>
+              <a:rPr lang="en-US" altLang="ko-KR" dirty="0" smtClean="0">
+                <a:solidFill>
+                  <a:schemeClr val="tx1"/>
+                </a:solidFill>
+              </a:rPr>
+              <a:t>)</a:t>
+            </a:r>
+          </a:p>
+          <a:p>
+            <a:pPr lvl="1" fontAlgn="base"/>
+            <a:endParaRPr lang="en-US" altLang="ko-KR" dirty="0">
+              <a:solidFill>
+                <a:schemeClr val="tx1"/>
+              </a:solidFill>
+            </a:endParaRPr>
+          </a:p>
+          <a:p>
+            <a:pPr lvl="1" fontAlgn="base"/>
+            <a:endParaRPr lang="en-US" altLang="ko-KR" dirty="0" smtClean="0">
+              <a:solidFill>
+                <a:schemeClr val="tx1"/>
+              </a:solidFill>
+            </a:endParaRPr>
+          </a:p>
+          <a:p>
+            <a:pPr lvl="1" fontAlgn="base"/>
+            <a:endParaRPr lang="en-US" altLang="ko-KR" dirty="0">
+              <a:solidFill>
+                <a:schemeClr val="tx1"/>
+              </a:solidFill>
+            </a:endParaRPr>
+          </a:p>
+          <a:p>
+            <a:pPr lvl="1" fontAlgn="base"/>
+            <a:endParaRPr lang="en-US" altLang="ko-KR" dirty="0" smtClean="0">
+              <a:solidFill>
+                <a:schemeClr val="tx1"/>
+              </a:solidFill>
+            </a:endParaRPr>
+          </a:p>
+          <a:p>
+            <a:pPr lvl="1" fontAlgn="base"/>
+            <a:endParaRPr lang="en-US" altLang="ko-KR" dirty="0">
+              <a:solidFill>
+                <a:schemeClr val="tx1"/>
+              </a:solidFill>
+            </a:endParaRPr>
+          </a:p>
+          <a:p>
+            <a:pPr lvl="1" fontAlgn="base"/>
+            <a:endParaRPr lang="en-US" altLang="ko-KR" dirty="0" smtClean="0">
+              <a:solidFill>
+                <a:schemeClr val="tx1"/>
+              </a:solidFill>
+            </a:endParaRPr>
+          </a:p>
+          <a:p>
+            <a:pPr lvl="1" fontAlgn="base"/>
+            <a:endParaRPr lang="en-US" altLang="ko-KR" dirty="0">
+              <a:solidFill>
+                <a:schemeClr val="tx1"/>
+              </a:solidFill>
+            </a:endParaRPr>
+          </a:p>
+          <a:p>
+            <a:pPr lvl="1" fontAlgn="base"/>
+            <a:r>
+              <a:rPr lang="en-US" altLang="ko-KR" dirty="0" smtClean="0">
+                <a:solidFill>
+                  <a:schemeClr val="tx1"/>
+                </a:solidFill>
+              </a:rPr>
+              <a:t>Naïve Bayes </a:t>
+            </a:r>
+            <a:r>
+              <a:rPr lang="ko-KR" altLang="en-US" dirty="0" smtClean="0">
+                <a:solidFill>
+                  <a:schemeClr val="tx1"/>
+                </a:solidFill>
+              </a:rPr>
+              <a:t>알고리즘 이용</a:t>
             </a:r>
             <a:endParaRPr lang="en-US" altLang="ko-KR" dirty="0" smtClean="0">
               <a:solidFill>
@@ -3739,7 +3855,7 @@
           </a:prstGeom>
           <a:extLst>
             <a:ext uri="{C572A759-6A51-4108-AA02-DFA0A04FC94B}">
-              <ma14:wrappingTextBoxFlag xmlns:ma14="http://schemas.microsoft.com/office/mac/drawingml/2011/main" xmlns:a14="http://schemas.microsoft.com/office/drawing/2010/main" xmlns:m="http://schemas.openxmlformats.org/officeDocument/2006/math" xmlns="" val="1"/>
+              <ma14:wrappingTextBoxFlag xmlns="" xmlns:m="http://schemas.openxmlformats.org/officeDocument/2006/math" xmlns:a14="http://schemas.microsoft.com/office/drawing/2010/main" xmlns:ma14="http://schemas.microsoft.com/office/mac/drawingml/2011/main" val="1"/>
             </a:ext>
           </a:extLst>
         </p:spPr>
@@ -3754,10 +3870,241 @@
           </a:p>
         </p:txBody>
       </p:sp>
+      <p:pic>
+        <p:nvPicPr>
+          <p:cNvPr id="8" name="Picture 7"/>
+          <p:cNvPicPr>
+            <a:picLocks noChangeAspect="1"/>
+          </p:cNvPicPr>
+          <p:nvPr/>
+        </p:nvPicPr>
+        <p:blipFill>
+          <a:blip r:embed="rId2"/>
+          <a:srcRect/>
+          <a:stretch>
+            <a:fillRect/>
+          </a:stretch>
+        </p:blipFill>
+        <p:spPr>
+          <a:xfrm>
+            <a:off x="1550341" y="3256564"/>
+            <a:ext cx="9557085" cy="3727263"/>
+          </a:xfrm>
+          <a:custGeom>
+            <a:avLst/>
+            <a:gdLst>
+              <a:gd name="connsiteX0" fmla="*/ 0 w 10961494"/>
+              <a:gd name="connsiteY0" fmla="*/ 0 h 4274983"/>
+              <a:gd name="connsiteX1" fmla="*/ 10961494 w 10961494"/>
+              <a:gd name="connsiteY1" fmla="*/ 0 h 4274983"/>
+              <a:gd name="connsiteX2" fmla="*/ 10961494 w 10961494"/>
+              <a:gd name="connsiteY2" fmla="*/ 4274983 h 4274983"/>
+              <a:gd name="connsiteX3" fmla="*/ 0 w 10961494"/>
+              <a:gd name="connsiteY3" fmla="*/ 4274983 h 4274983"/>
+              <a:gd name="connsiteX4" fmla="*/ 0 w 10961494"/>
+              <a:gd name="connsiteY4" fmla="*/ 1974137 h 4274983"/>
+              <a:gd name="connsiteX5" fmla="*/ 6121375 w 10961494"/>
+              <a:gd name="connsiteY5" fmla="*/ 1974137 h 4274983"/>
+              <a:gd name="connsiteX6" fmla="*/ 6121375 w 10961494"/>
+              <a:gd name="connsiteY6" fmla="*/ 613689 h 4274983"/>
+              <a:gd name="connsiteX7" fmla="*/ 0 w 10961494"/>
+              <a:gd name="connsiteY7" fmla="*/ 613689 h 4274983"/>
+            </a:gdLst>
+            <a:ahLst/>
+            <a:cxnLst>
+              <a:cxn ang="0">
+                <a:pos x="connsiteX0" y="connsiteY0"/>
+              </a:cxn>
+              <a:cxn ang="0">
+                <a:pos x="connsiteX1" y="connsiteY1"/>
+              </a:cxn>
+              <a:cxn ang="0">
+                <a:pos x="connsiteX2" y="connsiteY2"/>
+              </a:cxn>
+              <a:cxn ang="0">
+                <a:pos x="connsiteX3" y="connsiteY3"/>
+              </a:cxn>
+              <a:cxn ang="0">
+                <a:pos x="connsiteX4" y="connsiteY4"/>
+              </a:cxn>
+              <a:cxn ang="0">
+                <a:pos x="connsiteX5" y="connsiteY5"/>
+              </a:cxn>
+              <a:cxn ang="0">
+                <a:pos x="connsiteX6" y="connsiteY6"/>
+              </a:cxn>
+              <a:cxn ang="0">
+                <a:pos x="connsiteX7" y="connsiteY7"/>
+              </a:cxn>
+            </a:cxnLst>
+            <a:rect l="l" t="t" r="r" b="b"/>
+            <a:pathLst>
+              <a:path w="10961494" h="4274983">
+                <a:moveTo>
+                  <a:pt x="0" y="0"/>
+                </a:moveTo>
+                <a:lnTo>
+                  <a:pt x="10961494" y="0"/>
+                </a:lnTo>
+                <a:lnTo>
+                  <a:pt x="10961494" y="4274983"/>
+                </a:lnTo>
+                <a:lnTo>
+                  <a:pt x="0" y="4274983"/>
+                </a:lnTo>
+                <a:lnTo>
+                  <a:pt x="0" y="1974137"/>
+                </a:lnTo>
+                <a:lnTo>
+                  <a:pt x="6121375" y="1974137"/>
+                </a:lnTo>
+                <a:lnTo>
+                  <a:pt x="6121375" y="613689"/>
+                </a:lnTo>
+                <a:lnTo>
+                  <a:pt x="0" y="613689"/>
+                </a:lnTo>
+                <a:close/>
+              </a:path>
+            </a:pathLst>
+          </a:custGeom>
+        </p:spPr>
+      </p:pic>
+      <p:sp>
+        <p:nvSpPr>
+          <p:cNvPr id="5" name="TextBox 4"/>
+          <p:cNvSpPr txBox="1"/>
+          <p:nvPr/>
+        </p:nvSpPr>
+        <p:spPr>
+          <a:xfrm>
+            <a:off x="2241450" y="4280003"/>
+            <a:ext cx="3568285" cy="471924"/>
+          </a:xfrm>
+          <a:prstGeom prst="rect">
+            <a:avLst/>
+          </a:prstGeom>
+          <a:noFill/>
+          <a:ln w="12700" cap="flat">
+            <a:noFill/>
+            <a:miter lim="400000"/>
+          </a:ln>
+          <a:effectLst/>
+          <a:sp3d/>
+        </p:spPr>
+        <p:style>
+          <a:lnRef idx="0">
+            <a:scrgbClr r="0" g="0" b="0"/>
+          </a:lnRef>
+          <a:fillRef idx="0">
+            <a:scrgbClr r="0" g="0" b="0"/>
+          </a:fillRef>
+          <a:effectRef idx="0">
+            <a:scrgbClr r="0" g="0" b="0"/>
+          </a:effectRef>
+          <a:fontRef idx="none"/>
+        </p:style>
+        <p:txBody>
+          <a:bodyPr rot="0" spcFirstLastPara="1" vertOverflow="overflow" horzOverflow="overflow" vert="horz" wrap="none" lIns="50800" tIns="50800" rIns="50800" bIns="50800" numCol="1" spcCol="38100" rtlCol="0" anchor="ctr">
+            <a:spAutoFit/>
+          </a:bodyPr>
+          <a:lstStyle/>
+          <a:p>
+            <a:pPr marL="0" marR="0" indent="0" algn="ctr" defTabSz="584200" rtl="0" fontAlgn="auto" latinLnBrk="0" hangingPunct="0">
+              <a:lnSpc>
+                <a:spcPct val="100000"/>
+              </a:lnSpc>
+              <a:spcBef>
+                <a:spcPts val="0"/>
+              </a:spcBef>
+              <a:spcAft>
+                <a:spcPts val="0"/>
+              </a:spcAft>
+              <a:buClrTx/>
+              <a:buSzTx/>
+              <a:buFontTx/>
+              <a:buNone/>
+              <a:tabLst/>
+            </a:pPr>
+            <a:r>
+              <a:rPr kumimoji="0" lang="en-US" altLang="ko-KR" sz="2400" b="1" i="0" u="none" strike="noStrike" cap="none" spc="0" normalizeH="0" baseline="0" dirty="0" smtClean="0">
+                <a:ln>
+                  <a:noFill/>
+                </a:ln>
+                <a:solidFill>
+                  <a:srgbClr val="FF0000"/>
+                </a:solidFill>
+                <a:effectLst/>
+                <a:uFillTx/>
+                <a:latin typeface="Helvetica Neue"/>
+                <a:ea typeface="Helvetica Neue"/>
+                <a:cs typeface="Helvetica Neue"/>
+                <a:sym typeface="Helvetica Neue"/>
+              </a:rPr>
+              <a:t>(Not Publicly</a:t>
+            </a:r>
+            <a:r>
+              <a:rPr kumimoji="0" lang="en-US" altLang="ko-KR" sz="2400" b="1" i="0" u="none" strike="noStrike" cap="none" spc="0" normalizeH="0" dirty="0" smtClean="0">
+                <a:ln>
+                  <a:noFill/>
+                </a:ln>
+                <a:solidFill>
+                  <a:srgbClr val="FF0000"/>
+                </a:solidFill>
+                <a:effectLst/>
+                <a:uFillTx/>
+                <a:latin typeface="Helvetica Neue"/>
+                <a:ea typeface="Helvetica Neue"/>
+                <a:cs typeface="Helvetica Neue"/>
+                <a:sym typeface="Helvetica Neue"/>
+              </a:rPr>
+              <a:t> Available)</a:t>
+            </a:r>
+            <a:endParaRPr kumimoji="0" lang="ko-KR" altLang="en-US" sz="2400" b="1" i="0" u="none" strike="noStrike" cap="none" spc="0" normalizeH="0" baseline="0" dirty="0">
+              <a:ln>
+                <a:noFill/>
+              </a:ln>
+              <a:solidFill>
+                <a:srgbClr val="FF0000"/>
+              </a:solidFill>
+              <a:effectLst/>
+              <a:uFillTx/>
+              <a:latin typeface="Helvetica Neue"/>
+              <a:ea typeface="Helvetica Neue"/>
+              <a:cs typeface="Helvetica Neue"/>
+              <a:sym typeface="Helvetica Neue"/>
+            </a:endParaRPr>
+          </a:p>
+        </p:txBody>
+      </p:sp>
+      <p:pic>
+        <p:nvPicPr>
+          <p:cNvPr id="6" name="Picture 5"/>
+          <p:cNvPicPr>
+            <a:picLocks noChangeAspect="1"/>
+          </p:cNvPicPr>
+          <p:nvPr/>
+        </p:nvPicPr>
+        <p:blipFill>
+          <a:blip r:embed="rId3"/>
+          <a:stretch>
+            <a:fillRect/>
+          </a:stretch>
+        </p:blipFill>
+        <p:spPr>
+          <a:xfrm>
+            <a:off x="1550341" y="8004031"/>
+            <a:ext cx="9481015" cy="622306"/>
+          </a:xfrm>
+          <a:prstGeom prst="rect">
+            <a:avLst/>
+          </a:prstGeom>
+        </p:spPr>
+      </p:pic>
     </p:spTree>
     <p:extLst>
       <p:ext uri="{BB962C8B-B14F-4D97-AF65-F5344CB8AC3E}">
-        <p14:creationId xmlns:p14="http://schemas.microsoft.com/office/powerpoint/2010/main" val="2927059898"/>
+        <p14:creationId xmlns:p14="http://schemas.microsoft.com/office/powerpoint/2010/main" val="598237913"/>
       </p:ext>
     </p:extLst>
   </p:cSld>
@@ -3794,6 +4141,1255 @@
       </p:grpSpPr>
       <p:sp>
         <p:nvSpPr>
+          <p:cNvPr id="99" name="Current Status"/>
+          <p:cNvSpPr txBox="1">
+            <a:spLocks noGrp="1"/>
+          </p:cNvSpPr>
+          <p:nvPr>
+            <p:ph type="title"/>
+          </p:nvPr>
+        </p:nvSpPr>
+        <p:spPr>
+          <a:xfrm>
+            <a:off x="463550" y="254000"/>
+            <a:ext cx="12077700" cy="1798320"/>
+          </a:xfrm>
+          <a:prstGeom prst="rect">
+            <a:avLst/>
+          </a:prstGeom>
+        </p:spPr>
+        <p:txBody>
+          <a:bodyPr>
+            <a:normAutofit/>
+          </a:bodyPr>
+          <a:lstStyle/>
+          <a:p>
+            <a:pPr latinLnBrk="1"/>
+            <a:r>
+              <a:rPr lang="en-US" altLang="ko-KR" dirty="0" err="1" smtClean="0"/>
+              <a:t>Kaggle</a:t>
+            </a:r>
+            <a:r>
+              <a:rPr lang="en-US" altLang="ko-KR" dirty="0" smtClean="0"/>
+              <a:t> Competition</a:t>
+            </a:r>
+            <a:endParaRPr lang="ko-KR" altLang="ko-KR" dirty="0"/>
+          </a:p>
+        </p:txBody>
+      </p:sp>
+      <p:sp>
+        <p:nvSpPr>
+          <p:cNvPr id="100" name="주간 진행 사항…"/>
+          <p:cNvSpPr txBox="1">
+            <a:spLocks noGrp="1"/>
+          </p:cNvSpPr>
+          <p:nvPr>
+            <p:ph type="body" idx="1"/>
+          </p:nvPr>
+        </p:nvSpPr>
+        <p:spPr>
+          <a:xfrm>
+            <a:off x="695403" y="1836606"/>
+            <a:ext cx="11057983" cy="7017462"/>
+          </a:xfrm>
+          <a:prstGeom prst="rect">
+            <a:avLst/>
+          </a:prstGeom>
+        </p:spPr>
+        <p:txBody>
+          <a:bodyPr>
+            <a:normAutofit/>
+          </a:bodyPr>
+          <a:lstStyle/>
+          <a:p>
+            <a:pPr fontAlgn="base"/>
+            <a:r>
+              <a:rPr lang="en-US" altLang="ko-KR" dirty="0" smtClean="0">
+                <a:solidFill>
+                  <a:schemeClr val="tx1"/>
+                </a:solidFill>
+              </a:rPr>
+              <a:t>Don’t Get </a:t>
+            </a:r>
+            <a:r>
+              <a:rPr lang="en-US" altLang="ko-KR" dirty="0" smtClean="0">
+                <a:solidFill>
+                  <a:schemeClr val="tx1"/>
+                </a:solidFill>
+              </a:rPr>
+              <a:t>Kicked</a:t>
+            </a:r>
+          </a:p>
+          <a:p>
+            <a:pPr lvl="1" fontAlgn="base"/>
+            <a:r>
+              <a:rPr lang="ko-KR" altLang="en-US" dirty="0" smtClean="0">
+                <a:solidFill>
+                  <a:schemeClr val="tx1"/>
+                </a:solidFill>
+              </a:rPr>
+              <a:t>딥러닝 이용 </a:t>
+            </a:r>
+            <a:r>
+              <a:rPr lang="en-US" altLang="ko-KR" dirty="0" smtClean="0">
+                <a:solidFill>
+                  <a:schemeClr val="tx1"/>
+                </a:solidFill>
+              </a:rPr>
+              <a:t>(</a:t>
+            </a:r>
+            <a:r>
+              <a:rPr lang="ko-KR" altLang="en-US" dirty="0" smtClean="0">
+                <a:solidFill>
+                  <a:schemeClr val="tx1"/>
+                </a:solidFill>
+              </a:rPr>
+              <a:t>학습 및 테스트 데이터 열 지정 오류 수정 이후</a:t>
+            </a:r>
+            <a:r>
+              <a:rPr lang="en-US" altLang="ko-KR" dirty="0" smtClean="0">
+                <a:solidFill>
+                  <a:schemeClr val="tx1"/>
+                </a:solidFill>
+              </a:rPr>
+              <a:t>)</a:t>
+            </a:r>
+          </a:p>
+          <a:p>
+            <a:pPr lvl="1" fontAlgn="base"/>
+            <a:endParaRPr lang="en-US" altLang="ko-KR" dirty="0">
+              <a:solidFill>
+                <a:schemeClr val="tx1"/>
+              </a:solidFill>
+            </a:endParaRPr>
+          </a:p>
+          <a:p>
+            <a:pPr lvl="1" fontAlgn="base"/>
+            <a:endParaRPr lang="en-US" altLang="ko-KR" dirty="0" smtClean="0">
+              <a:solidFill>
+                <a:schemeClr val="tx1"/>
+              </a:solidFill>
+            </a:endParaRPr>
+          </a:p>
+          <a:p>
+            <a:pPr lvl="1" fontAlgn="base"/>
+            <a:endParaRPr lang="en-US" altLang="ko-KR" dirty="0">
+              <a:solidFill>
+                <a:schemeClr val="tx1"/>
+              </a:solidFill>
+            </a:endParaRPr>
+          </a:p>
+          <a:p>
+            <a:pPr lvl="1" fontAlgn="base"/>
+            <a:endParaRPr lang="en-US" altLang="ko-KR" dirty="0" smtClean="0">
+              <a:solidFill>
+                <a:schemeClr val="tx1"/>
+              </a:solidFill>
+            </a:endParaRPr>
+          </a:p>
+          <a:p>
+            <a:pPr lvl="1" fontAlgn="base"/>
+            <a:endParaRPr lang="en-US" altLang="ko-KR" dirty="0">
+              <a:solidFill>
+                <a:schemeClr val="tx1"/>
+              </a:solidFill>
+            </a:endParaRPr>
+          </a:p>
+          <a:p>
+            <a:pPr lvl="1" fontAlgn="base"/>
+            <a:endParaRPr lang="en-US" altLang="ko-KR" dirty="0" smtClean="0">
+              <a:solidFill>
+                <a:schemeClr val="tx1"/>
+              </a:solidFill>
+            </a:endParaRPr>
+          </a:p>
+          <a:p>
+            <a:pPr lvl="1" fontAlgn="base"/>
+            <a:endParaRPr lang="en-US" altLang="ko-KR" dirty="0">
+              <a:solidFill>
+                <a:schemeClr val="tx1"/>
+              </a:solidFill>
+            </a:endParaRPr>
+          </a:p>
+          <a:p>
+            <a:pPr lvl="1" fontAlgn="base"/>
+            <a:r>
+              <a:rPr lang="en-US" altLang="ko-KR" dirty="0" smtClean="0">
+                <a:solidFill>
+                  <a:schemeClr val="tx1"/>
+                </a:solidFill>
+              </a:rPr>
+              <a:t>Naïve Bayes </a:t>
+            </a:r>
+            <a:r>
+              <a:rPr lang="ko-KR" altLang="en-US" dirty="0" smtClean="0">
+                <a:solidFill>
+                  <a:schemeClr val="tx1"/>
+                </a:solidFill>
+              </a:rPr>
+              <a:t>알고리즘 이용</a:t>
+            </a:r>
+            <a:endParaRPr lang="en-US" altLang="ko-KR" dirty="0" smtClean="0">
+              <a:solidFill>
+                <a:srgbClr val="FF0000"/>
+              </a:solidFill>
+            </a:endParaRPr>
+          </a:p>
+        </p:txBody>
+      </p:sp>
+      <p:sp>
+        <p:nvSpPr>
+          <p:cNvPr id="101" name="Slide Number"/>
+          <p:cNvSpPr txBox="1">
+            <a:spLocks noGrp="1"/>
+          </p:cNvSpPr>
+          <p:nvPr>
+            <p:ph type="sldNum" sz="quarter" idx="2"/>
+          </p:nvPr>
+        </p:nvSpPr>
+        <p:spPr>
+          <a:prstGeom prst="rect">
+            <a:avLst/>
+          </a:prstGeom>
+          <a:extLst>
+            <a:ext uri="{C572A759-6A51-4108-AA02-DFA0A04FC94B}">
+              <ma14:wrappingTextBoxFlag xmlns="" xmlns:m="http://schemas.openxmlformats.org/officeDocument/2006/math" xmlns:a14="http://schemas.microsoft.com/office/drawing/2010/main" xmlns:ma14="http://schemas.microsoft.com/office/mac/drawingml/2011/main" val="1"/>
+            </a:ext>
+          </a:extLst>
+        </p:spPr>
+        <p:txBody>
+          <a:bodyPr/>
+          <a:lstStyle/>
+          <a:p>
+            <a:fld id="{86CB4B4D-7CA3-9044-876B-883B54F8677D}" type="slidenum">
+              <a:t>11</a:t>
+            </a:fld>
+            <a:endParaRPr/>
+          </a:p>
+        </p:txBody>
+      </p:sp>
+      <p:pic>
+        <p:nvPicPr>
+          <p:cNvPr id="8" name="Picture 7"/>
+          <p:cNvPicPr>
+            <a:picLocks noChangeAspect="1"/>
+          </p:cNvPicPr>
+          <p:nvPr/>
+        </p:nvPicPr>
+        <p:blipFill>
+          <a:blip r:embed="rId2"/>
+          <a:srcRect/>
+          <a:stretch>
+            <a:fillRect/>
+          </a:stretch>
+        </p:blipFill>
+        <p:spPr>
+          <a:xfrm>
+            <a:off x="1550341" y="3256564"/>
+            <a:ext cx="9557085" cy="3727263"/>
+          </a:xfrm>
+          <a:custGeom>
+            <a:avLst/>
+            <a:gdLst>
+              <a:gd name="connsiteX0" fmla="*/ 0 w 10961494"/>
+              <a:gd name="connsiteY0" fmla="*/ 0 h 4274983"/>
+              <a:gd name="connsiteX1" fmla="*/ 10961494 w 10961494"/>
+              <a:gd name="connsiteY1" fmla="*/ 0 h 4274983"/>
+              <a:gd name="connsiteX2" fmla="*/ 10961494 w 10961494"/>
+              <a:gd name="connsiteY2" fmla="*/ 4274983 h 4274983"/>
+              <a:gd name="connsiteX3" fmla="*/ 0 w 10961494"/>
+              <a:gd name="connsiteY3" fmla="*/ 4274983 h 4274983"/>
+              <a:gd name="connsiteX4" fmla="*/ 0 w 10961494"/>
+              <a:gd name="connsiteY4" fmla="*/ 1974137 h 4274983"/>
+              <a:gd name="connsiteX5" fmla="*/ 6121375 w 10961494"/>
+              <a:gd name="connsiteY5" fmla="*/ 1974137 h 4274983"/>
+              <a:gd name="connsiteX6" fmla="*/ 6121375 w 10961494"/>
+              <a:gd name="connsiteY6" fmla="*/ 613689 h 4274983"/>
+              <a:gd name="connsiteX7" fmla="*/ 0 w 10961494"/>
+              <a:gd name="connsiteY7" fmla="*/ 613689 h 4274983"/>
+            </a:gdLst>
+            <a:ahLst/>
+            <a:cxnLst>
+              <a:cxn ang="0">
+                <a:pos x="connsiteX0" y="connsiteY0"/>
+              </a:cxn>
+              <a:cxn ang="0">
+                <a:pos x="connsiteX1" y="connsiteY1"/>
+              </a:cxn>
+              <a:cxn ang="0">
+                <a:pos x="connsiteX2" y="connsiteY2"/>
+              </a:cxn>
+              <a:cxn ang="0">
+                <a:pos x="connsiteX3" y="connsiteY3"/>
+              </a:cxn>
+              <a:cxn ang="0">
+                <a:pos x="connsiteX4" y="connsiteY4"/>
+              </a:cxn>
+              <a:cxn ang="0">
+                <a:pos x="connsiteX5" y="connsiteY5"/>
+              </a:cxn>
+              <a:cxn ang="0">
+                <a:pos x="connsiteX6" y="connsiteY6"/>
+              </a:cxn>
+              <a:cxn ang="0">
+                <a:pos x="connsiteX7" y="connsiteY7"/>
+              </a:cxn>
+            </a:cxnLst>
+            <a:rect l="l" t="t" r="r" b="b"/>
+            <a:pathLst>
+              <a:path w="10961494" h="4274983">
+                <a:moveTo>
+                  <a:pt x="0" y="0"/>
+                </a:moveTo>
+                <a:lnTo>
+                  <a:pt x="10961494" y="0"/>
+                </a:lnTo>
+                <a:lnTo>
+                  <a:pt x="10961494" y="4274983"/>
+                </a:lnTo>
+                <a:lnTo>
+                  <a:pt x="0" y="4274983"/>
+                </a:lnTo>
+                <a:lnTo>
+                  <a:pt x="0" y="1974137"/>
+                </a:lnTo>
+                <a:lnTo>
+                  <a:pt x="6121375" y="1974137"/>
+                </a:lnTo>
+                <a:lnTo>
+                  <a:pt x="6121375" y="613689"/>
+                </a:lnTo>
+                <a:lnTo>
+                  <a:pt x="0" y="613689"/>
+                </a:lnTo>
+                <a:close/>
+              </a:path>
+            </a:pathLst>
+          </a:custGeom>
+        </p:spPr>
+      </p:pic>
+      <p:sp>
+        <p:nvSpPr>
+          <p:cNvPr id="5" name="TextBox 4"/>
+          <p:cNvSpPr txBox="1"/>
+          <p:nvPr/>
+        </p:nvSpPr>
+        <p:spPr>
+          <a:xfrm>
+            <a:off x="2241450" y="4280003"/>
+            <a:ext cx="3568285" cy="471924"/>
+          </a:xfrm>
+          <a:prstGeom prst="rect">
+            <a:avLst/>
+          </a:prstGeom>
+          <a:noFill/>
+          <a:ln w="12700" cap="flat">
+            <a:noFill/>
+            <a:miter lim="400000"/>
+          </a:ln>
+          <a:effectLst/>
+          <a:sp3d/>
+        </p:spPr>
+        <p:style>
+          <a:lnRef idx="0">
+            <a:scrgbClr r="0" g="0" b="0"/>
+          </a:lnRef>
+          <a:fillRef idx="0">
+            <a:scrgbClr r="0" g="0" b="0"/>
+          </a:fillRef>
+          <a:effectRef idx="0">
+            <a:scrgbClr r="0" g="0" b="0"/>
+          </a:effectRef>
+          <a:fontRef idx="none"/>
+        </p:style>
+        <p:txBody>
+          <a:bodyPr rot="0" spcFirstLastPara="1" vertOverflow="overflow" horzOverflow="overflow" vert="horz" wrap="none" lIns="50800" tIns="50800" rIns="50800" bIns="50800" numCol="1" spcCol="38100" rtlCol="0" anchor="ctr">
+            <a:spAutoFit/>
+          </a:bodyPr>
+          <a:lstStyle/>
+          <a:p>
+            <a:pPr marL="0" marR="0" indent="0" algn="ctr" defTabSz="584200" rtl="0" fontAlgn="auto" latinLnBrk="0" hangingPunct="0">
+              <a:lnSpc>
+                <a:spcPct val="100000"/>
+              </a:lnSpc>
+              <a:spcBef>
+                <a:spcPts val="0"/>
+              </a:spcBef>
+              <a:spcAft>
+                <a:spcPts val="0"/>
+              </a:spcAft>
+              <a:buClrTx/>
+              <a:buSzTx/>
+              <a:buFontTx/>
+              <a:buNone/>
+              <a:tabLst/>
+            </a:pPr>
+            <a:r>
+              <a:rPr kumimoji="0" lang="en-US" altLang="ko-KR" sz="2400" b="1" i="0" u="none" strike="noStrike" cap="none" spc="0" normalizeH="0" baseline="0" dirty="0" smtClean="0">
+                <a:ln>
+                  <a:noFill/>
+                </a:ln>
+                <a:solidFill>
+                  <a:srgbClr val="FF0000"/>
+                </a:solidFill>
+                <a:effectLst/>
+                <a:uFillTx/>
+                <a:latin typeface="Helvetica Neue"/>
+                <a:ea typeface="Helvetica Neue"/>
+                <a:cs typeface="Helvetica Neue"/>
+                <a:sym typeface="Helvetica Neue"/>
+              </a:rPr>
+              <a:t>(Not Publicly</a:t>
+            </a:r>
+            <a:r>
+              <a:rPr kumimoji="0" lang="en-US" altLang="ko-KR" sz="2400" b="1" i="0" u="none" strike="noStrike" cap="none" spc="0" normalizeH="0" dirty="0" smtClean="0">
+                <a:ln>
+                  <a:noFill/>
+                </a:ln>
+                <a:solidFill>
+                  <a:srgbClr val="FF0000"/>
+                </a:solidFill>
+                <a:effectLst/>
+                <a:uFillTx/>
+                <a:latin typeface="Helvetica Neue"/>
+                <a:ea typeface="Helvetica Neue"/>
+                <a:cs typeface="Helvetica Neue"/>
+                <a:sym typeface="Helvetica Neue"/>
+              </a:rPr>
+              <a:t> Available)</a:t>
+            </a:r>
+            <a:endParaRPr kumimoji="0" lang="ko-KR" altLang="en-US" sz="2400" b="1" i="0" u="none" strike="noStrike" cap="none" spc="0" normalizeH="0" baseline="0" dirty="0">
+              <a:ln>
+                <a:noFill/>
+              </a:ln>
+              <a:solidFill>
+                <a:srgbClr val="FF0000"/>
+              </a:solidFill>
+              <a:effectLst/>
+              <a:uFillTx/>
+              <a:latin typeface="Helvetica Neue"/>
+              <a:ea typeface="Helvetica Neue"/>
+              <a:cs typeface="Helvetica Neue"/>
+              <a:sym typeface="Helvetica Neue"/>
+            </a:endParaRPr>
+          </a:p>
+        </p:txBody>
+      </p:sp>
+      <p:pic>
+        <p:nvPicPr>
+          <p:cNvPr id="6" name="Picture 5"/>
+          <p:cNvPicPr>
+            <a:picLocks noChangeAspect="1"/>
+          </p:cNvPicPr>
+          <p:nvPr/>
+        </p:nvPicPr>
+        <p:blipFill>
+          <a:blip r:embed="rId3"/>
+          <a:stretch>
+            <a:fillRect/>
+          </a:stretch>
+        </p:blipFill>
+        <p:spPr>
+          <a:xfrm>
+            <a:off x="1550341" y="8004031"/>
+            <a:ext cx="9481015" cy="622306"/>
+          </a:xfrm>
+          <a:prstGeom prst="rect">
+            <a:avLst/>
+          </a:prstGeom>
+        </p:spPr>
+      </p:pic>
+    </p:spTree>
+    <p:extLst>
+      <p:ext uri="{BB962C8B-B14F-4D97-AF65-F5344CB8AC3E}">
+        <p14:creationId xmlns:p14="http://schemas.microsoft.com/office/powerpoint/2010/main" val="1168699021"/>
+      </p:ext>
+    </p:extLst>
+  </p:cSld>
+  <p:clrMapOvr>
+    <a:masterClrMapping/>
+  </p:clrMapOvr>
+  <p:transition spd="med"/>
+  <p:timing>
+    <p:tnLst>
+      <p:par>
+        <p:cTn id="1" dur="indefinite" restart="never" nodeType="tmRoot"/>
+      </p:par>
+    </p:tnLst>
+  </p:timing>
+</p:sld>
+</file>
+
+<file path=ppt/slides/slide12.xml><?xml version="1.0" encoding="utf-8"?>
+<p:sld xmlns:a="http://schemas.openxmlformats.org/drawingml/2006/main" xmlns:r="http://schemas.openxmlformats.org/officeDocument/2006/relationships" xmlns:p="http://schemas.openxmlformats.org/presentationml/2006/main">
+  <p:cSld>
+    <p:spTree>
+      <p:nvGrpSpPr>
+        <p:cNvPr id="1" name=""/>
+        <p:cNvGrpSpPr/>
+        <p:nvPr/>
+      </p:nvGrpSpPr>
+      <p:grpSpPr>
+        <a:xfrm>
+          <a:off x="0" y="0"/>
+          <a:ext cx="0" cy="0"/>
+          <a:chOff x="0" y="0"/>
+          <a:chExt cx="0" cy="0"/>
+        </a:xfrm>
+      </p:grpSpPr>
+      <p:sp>
+        <p:nvSpPr>
+          <p:cNvPr id="99" name="Current Status"/>
+          <p:cNvSpPr txBox="1">
+            <a:spLocks noGrp="1"/>
+          </p:cNvSpPr>
+          <p:nvPr>
+            <p:ph type="title"/>
+          </p:nvPr>
+        </p:nvSpPr>
+        <p:spPr>
+          <a:xfrm>
+            <a:off x="463550" y="254000"/>
+            <a:ext cx="12077700" cy="1798320"/>
+          </a:xfrm>
+          <a:prstGeom prst="rect">
+            <a:avLst/>
+          </a:prstGeom>
+        </p:spPr>
+        <p:txBody>
+          <a:bodyPr>
+            <a:normAutofit/>
+          </a:bodyPr>
+          <a:lstStyle/>
+          <a:p>
+            <a:pPr latinLnBrk="1"/>
+            <a:r>
+              <a:rPr lang="en-US" altLang="ko-KR" dirty="0" err="1" smtClean="0"/>
+              <a:t>Kaggle</a:t>
+            </a:r>
+            <a:r>
+              <a:rPr lang="en-US" altLang="ko-KR" dirty="0" smtClean="0"/>
+              <a:t> Competition</a:t>
+            </a:r>
+            <a:endParaRPr lang="ko-KR" altLang="ko-KR" dirty="0"/>
+          </a:p>
+        </p:txBody>
+      </p:sp>
+      <p:sp>
+        <p:nvSpPr>
+          <p:cNvPr id="100" name="주간 진행 사항…"/>
+          <p:cNvSpPr txBox="1">
+            <a:spLocks noGrp="1"/>
+          </p:cNvSpPr>
+          <p:nvPr>
+            <p:ph type="body" idx="1"/>
+          </p:nvPr>
+        </p:nvSpPr>
+        <p:spPr>
+          <a:xfrm>
+            <a:off x="695403" y="1836606"/>
+            <a:ext cx="11057983" cy="7017462"/>
+          </a:xfrm>
+          <a:prstGeom prst="rect">
+            <a:avLst/>
+          </a:prstGeom>
+        </p:spPr>
+        <p:txBody>
+          <a:bodyPr>
+            <a:normAutofit/>
+          </a:bodyPr>
+          <a:lstStyle/>
+          <a:p>
+            <a:pPr fontAlgn="base"/>
+            <a:r>
+              <a:rPr lang="en-US" altLang="ko-KR" dirty="0" smtClean="0">
+                <a:solidFill>
+                  <a:schemeClr val="tx1"/>
+                </a:solidFill>
+              </a:rPr>
+              <a:t>Don’t Get </a:t>
+            </a:r>
+            <a:r>
+              <a:rPr lang="en-US" altLang="ko-KR" dirty="0" smtClean="0">
+                <a:solidFill>
+                  <a:schemeClr val="tx1"/>
+                </a:solidFill>
+              </a:rPr>
+              <a:t>Kicked</a:t>
+            </a:r>
+          </a:p>
+          <a:p>
+            <a:pPr lvl="1" fontAlgn="base"/>
+            <a:r>
+              <a:rPr lang="ko-KR" altLang="en-US" dirty="0" smtClean="0">
+                <a:solidFill>
+                  <a:schemeClr val="tx1"/>
+                </a:solidFill>
+              </a:rPr>
+              <a:t>딥러닝 이용 </a:t>
+            </a:r>
+            <a:r>
+              <a:rPr lang="en-US" altLang="ko-KR" dirty="0" smtClean="0">
+                <a:solidFill>
+                  <a:schemeClr val="tx1"/>
+                </a:solidFill>
+              </a:rPr>
+              <a:t>(Model Training </a:t>
+            </a:r>
+            <a:r>
+              <a:rPr lang="ko-KR" altLang="en-US" dirty="0" smtClean="0">
+                <a:solidFill>
+                  <a:schemeClr val="tx1"/>
+                </a:solidFill>
+              </a:rPr>
+              <a:t>기준</a:t>
+            </a:r>
+            <a:r>
+              <a:rPr lang="ko-KR" altLang="en-US" dirty="0" smtClean="0">
+                <a:solidFill>
+                  <a:schemeClr val="tx1"/>
+                </a:solidFill>
+              </a:rPr>
+              <a:t> 정확도 약 </a:t>
+            </a:r>
+            <a:r>
+              <a:rPr lang="en-US" altLang="ko-KR" dirty="0" smtClean="0">
+                <a:solidFill>
+                  <a:schemeClr val="tx1"/>
+                </a:solidFill>
+              </a:rPr>
+              <a:t>99%)</a:t>
+            </a:r>
+            <a:endParaRPr lang="en-US" altLang="ko-KR" dirty="0">
+              <a:solidFill>
+                <a:schemeClr val="tx1"/>
+              </a:solidFill>
+            </a:endParaRPr>
+          </a:p>
+        </p:txBody>
+      </p:sp>
+      <p:sp>
+        <p:nvSpPr>
+          <p:cNvPr id="101" name="Slide Number"/>
+          <p:cNvSpPr txBox="1">
+            <a:spLocks noGrp="1"/>
+          </p:cNvSpPr>
+          <p:nvPr>
+            <p:ph type="sldNum" sz="quarter" idx="2"/>
+          </p:nvPr>
+        </p:nvSpPr>
+        <p:spPr>
+          <a:prstGeom prst="rect">
+            <a:avLst/>
+          </a:prstGeom>
+          <a:extLst>
+            <a:ext uri="{C572A759-6A51-4108-AA02-DFA0A04FC94B}">
+              <ma14:wrappingTextBoxFlag xmlns="" xmlns:m="http://schemas.openxmlformats.org/officeDocument/2006/math" xmlns:a14="http://schemas.microsoft.com/office/drawing/2010/main" xmlns:ma14="http://schemas.microsoft.com/office/mac/drawingml/2011/main" val="1"/>
+            </a:ext>
+          </a:extLst>
+        </p:spPr>
+        <p:txBody>
+          <a:bodyPr/>
+          <a:lstStyle/>
+          <a:p>
+            <a:fld id="{86CB4B4D-7CA3-9044-876B-883B54F8677D}" type="slidenum">
+              <a:t>12</a:t>
+            </a:fld>
+            <a:endParaRPr/>
+          </a:p>
+        </p:txBody>
+      </p:sp>
+      <p:pic>
+        <p:nvPicPr>
+          <p:cNvPr id="2" name="Picture 1"/>
+          <p:cNvPicPr>
+            <a:picLocks noChangeAspect="1"/>
+          </p:cNvPicPr>
+          <p:nvPr/>
+        </p:nvPicPr>
+        <p:blipFill>
+          <a:blip r:embed="rId2"/>
+          <a:stretch>
+            <a:fillRect/>
+          </a:stretch>
+        </p:blipFill>
+        <p:spPr>
+          <a:xfrm>
+            <a:off x="472068" y="4088092"/>
+            <a:ext cx="11504651" cy="2514490"/>
+          </a:xfrm>
+          <a:prstGeom prst="rect">
+            <a:avLst/>
+          </a:prstGeom>
+        </p:spPr>
+      </p:pic>
+      <p:pic>
+        <p:nvPicPr>
+          <p:cNvPr id="11" name="Picture 10"/>
+          <p:cNvPicPr>
+            <a:picLocks noChangeAspect="1"/>
+          </p:cNvPicPr>
+          <p:nvPr/>
+        </p:nvPicPr>
+        <p:blipFill>
+          <a:blip r:embed="rId3"/>
+          <a:srcRect/>
+          <a:stretch>
+            <a:fillRect/>
+          </a:stretch>
+        </p:blipFill>
+        <p:spPr>
+          <a:xfrm>
+            <a:off x="385678" y="7246018"/>
+            <a:ext cx="11886412" cy="1147009"/>
+          </a:xfrm>
+          <a:custGeom>
+            <a:avLst/>
+            <a:gdLst>
+              <a:gd name="connsiteX0" fmla="*/ 1677298 w 11886412"/>
+              <a:gd name="connsiteY0" fmla="*/ 136089 h 1147009"/>
+              <a:gd name="connsiteX1" fmla="*/ 1677298 w 11886412"/>
+              <a:gd name="connsiteY1" fmla="*/ 983582 h 1147009"/>
+              <a:gd name="connsiteX2" fmla="*/ 3751424 w 11886412"/>
+              <a:gd name="connsiteY2" fmla="*/ 983582 h 1147009"/>
+              <a:gd name="connsiteX3" fmla="*/ 3751424 w 11886412"/>
+              <a:gd name="connsiteY3" fmla="*/ 136089 h 1147009"/>
+              <a:gd name="connsiteX4" fmla="*/ 0 w 11886412"/>
+              <a:gd name="connsiteY4" fmla="*/ 0 h 1147009"/>
+              <a:gd name="connsiteX5" fmla="*/ 11886412 w 11886412"/>
+              <a:gd name="connsiteY5" fmla="*/ 0 h 1147009"/>
+              <a:gd name="connsiteX6" fmla="*/ 11886412 w 11886412"/>
+              <a:gd name="connsiteY6" fmla="*/ 1147009 h 1147009"/>
+              <a:gd name="connsiteX7" fmla="*/ 0 w 11886412"/>
+              <a:gd name="connsiteY7" fmla="*/ 1147009 h 1147009"/>
+            </a:gdLst>
+            <a:ahLst/>
+            <a:cxnLst>
+              <a:cxn ang="0">
+                <a:pos x="connsiteX0" y="connsiteY0"/>
+              </a:cxn>
+              <a:cxn ang="0">
+                <a:pos x="connsiteX1" y="connsiteY1"/>
+              </a:cxn>
+              <a:cxn ang="0">
+                <a:pos x="connsiteX2" y="connsiteY2"/>
+              </a:cxn>
+              <a:cxn ang="0">
+                <a:pos x="connsiteX3" y="connsiteY3"/>
+              </a:cxn>
+              <a:cxn ang="0">
+                <a:pos x="connsiteX4" y="connsiteY4"/>
+              </a:cxn>
+              <a:cxn ang="0">
+                <a:pos x="connsiteX5" y="connsiteY5"/>
+              </a:cxn>
+              <a:cxn ang="0">
+                <a:pos x="connsiteX6" y="connsiteY6"/>
+              </a:cxn>
+              <a:cxn ang="0">
+                <a:pos x="connsiteX7" y="connsiteY7"/>
+              </a:cxn>
+            </a:cxnLst>
+            <a:rect l="l" t="t" r="r" b="b"/>
+            <a:pathLst>
+              <a:path w="11886412" h="1147009">
+                <a:moveTo>
+                  <a:pt x="1677298" y="136089"/>
+                </a:moveTo>
+                <a:lnTo>
+                  <a:pt x="1677298" y="983582"/>
+                </a:lnTo>
+                <a:lnTo>
+                  <a:pt x="3751424" y="983582"/>
+                </a:lnTo>
+                <a:lnTo>
+                  <a:pt x="3751424" y="136089"/>
+                </a:lnTo>
+                <a:close/>
+                <a:moveTo>
+                  <a:pt x="0" y="0"/>
+                </a:moveTo>
+                <a:lnTo>
+                  <a:pt x="11886412" y="0"/>
+                </a:lnTo>
+                <a:lnTo>
+                  <a:pt x="11886412" y="1147009"/>
+                </a:lnTo>
+                <a:lnTo>
+                  <a:pt x="0" y="1147009"/>
+                </a:lnTo>
+                <a:close/>
+              </a:path>
+            </a:pathLst>
+          </a:custGeom>
+        </p:spPr>
+      </p:pic>
+      <p:sp>
+        <p:nvSpPr>
+          <p:cNvPr id="12" name="TextBox 11"/>
+          <p:cNvSpPr txBox="1"/>
+          <p:nvPr/>
+        </p:nvSpPr>
+        <p:spPr>
+          <a:xfrm>
+            <a:off x="385678" y="8123219"/>
+            <a:ext cx="771045" cy="471924"/>
+          </a:xfrm>
+          <a:prstGeom prst="rect">
+            <a:avLst/>
+          </a:prstGeom>
+          <a:noFill/>
+          <a:ln w="12700" cap="flat">
+            <a:noFill/>
+            <a:miter lim="400000"/>
+          </a:ln>
+          <a:effectLst/>
+          <a:sp3d/>
+        </p:spPr>
+        <p:style>
+          <a:lnRef idx="0">
+            <a:scrgbClr r="0" g="0" b="0"/>
+          </a:lnRef>
+          <a:fillRef idx="0">
+            <a:scrgbClr r="0" g="0" b="0"/>
+          </a:fillRef>
+          <a:effectRef idx="0">
+            <a:scrgbClr r="0" g="0" b="0"/>
+          </a:effectRef>
+          <a:fontRef idx="none"/>
+        </p:style>
+        <p:txBody>
+          <a:bodyPr rot="0" spcFirstLastPara="1" vertOverflow="overflow" horzOverflow="overflow" vert="horz" wrap="none" lIns="50800" tIns="50800" rIns="50800" bIns="50800" numCol="1" spcCol="38100" rtlCol="0" anchor="ctr">
+            <a:spAutoFit/>
+          </a:bodyPr>
+          <a:lstStyle/>
+          <a:p>
+            <a:pPr marL="0" marR="0" indent="0" algn="ctr" defTabSz="584200" rtl="0" fontAlgn="auto" latinLnBrk="0" hangingPunct="0">
+              <a:lnSpc>
+                <a:spcPct val="100000"/>
+              </a:lnSpc>
+              <a:spcBef>
+                <a:spcPts val="0"/>
+              </a:spcBef>
+              <a:spcAft>
+                <a:spcPts val="0"/>
+              </a:spcAft>
+              <a:buClrTx/>
+              <a:buSzTx/>
+              <a:buFontTx/>
+              <a:buNone/>
+              <a:tabLst/>
+            </a:pPr>
+            <a:r>
+              <a:rPr kumimoji="0" lang="en-US" altLang="ko-KR" sz="2400" b="1" i="0" u="none" strike="noStrike" cap="none" spc="0" normalizeH="0" baseline="0" dirty="0" smtClean="0">
+                <a:ln>
+                  <a:noFill/>
+                </a:ln>
+                <a:solidFill>
+                  <a:srgbClr val="FF0000"/>
+                </a:solidFill>
+                <a:effectLst/>
+                <a:uFillTx/>
+                <a:latin typeface="Helvetica Neue"/>
+                <a:ea typeface="Helvetica Neue"/>
+                <a:cs typeface="Helvetica Neue"/>
+                <a:sym typeface="Helvetica Neue"/>
+              </a:rPr>
+              <a:t>/570</a:t>
+            </a:r>
+            <a:endParaRPr kumimoji="0" lang="ko-KR" altLang="en-US" sz="2400" b="1" i="0" u="none" strike="noStrike" cap="none" spc="0" normalizeH="0" baseline="0" dirty="0">
+              <a:ln>
+                <a:noFill/>
+              </a:ln>
+              <a:solidFill>
+                <a:srgbClr val="FF0000"/>
+              </a:solidFill>
+              <a:effectLst/>
+              <a:uFillTx/>
+              <a:latin typeface="Helvetica Neue"/>
+              <a:ea typeface="Helvetica Neue"/>
+              <a:cs typeface="Helvetica Neue"/>
+              <a:sym typeface="Helvetica Neue"/>
+            </a:endParaRPr>
+          </a:p>
+        </p:txBody>
+      </p:sp>
+    </p:spTree>
+    <p:extLst>
+      <p:ext uri="{BB962C8B-B14F-4D97-AF65-F5344CB8AC3E}">
+        <p14:creationId xmlns:p14="http://schemas.microsoft.com/office/powerpoint/2010/main" val="663813521"/>
+      </p:ext>
+    </p:extLst>
+  </p:cSld>
+  <p:clrMapOvr>
+    <a:masterClrMapping/>
+  </p:clrMapOvr>
+  <p:transition spd="med"/>
+  <p:timing>
+    <p:tnLst>
+      <p:par>
+        <p:cTn id="1" dur="indefinite" restart="never" nodeType="tmRoot"/>
+      </p:par>
+    </p:tnLst>
+  </p:timing>
+</p:sld>
+</file>
+
+<file path=ppt/slides/slide13.xml><?xml version="1.0" encoding="utf-8"?>
+<p:sld xmlns:a="http://schemas.openxmlformats.org/drawingml/2006/main" xmlns:r="http://schemas.openxmlformats.org/officeDocument/2006/relationships" xmlns:p="http://schemas.openxmlformats.org/presentationml/2006/main">
+  <p:cSld>
+    <p:spTree>
+      <p:nvGrpSpPr>
+        <p:cNvPr id="1" name=""/>
+        <p:cNvGrpSpPr/>
+        <p:nvPr/>
+      </p:nvGrpSpPr>
+      <p:grpSpPr>
+        <a:xfrm>
+          <a:off x="0" y="0"/>
+          <a:ext cx="0" cy="0"/>
+          <a:chOff x="0" y="0"/>
+          <a:chExt cx="0" cy="0"/>
+        </a:xfrm>
+      </p:grpSpPr>
+      <p:sp>
+        <p:nvSpPr>
+          <p:cNvPr id="99" name="Current Status"/>
+          <p:cNvSpPr txBox="1">
+            <a:spLocks noGrp="1"/>
+          </p:cNvSpPr>
+          <p:nvPr>
+            <p:ph type="title"/>
+          </p:nvPr>
+        </p:nvSpPr>
+        <p:spPr>
+          <a:xfrm>
+            <a:off x="463550" y="254000"/>
+            <a:ext cx="12077700" cy="1798320"/>
+          </a:xfrm>
+          <a:prstGeom prst="rect">
+            <a:avLst/>
+          </a:prstGeom>
+        </p:spPr>
+        <p:txBody>
+          <a:bodyPr>
+            <a:normAutofit/>
+          </a:bodyPr>
+          <a:lstStyle/>
+          <a:p>
+            <a:pPr latinLnBrk="1"/>
+            <a:r>
+              <a:rPr lang="en-US" altLang="ko-KR" dirty="0" err="1" smtClean="0"/>
+              <a:t>Kaggle</a:t>
+            </a:r>
+            <a:r>
+              <a:rPr lang="en-US" altLang="ko-KR" dirty="0" smtClean="0"/>
+              <a:t> Competition</a:t>
+            </a:r>
+            <a:endParaRPr lang="ko-KR" altLang="ko-KR" dirty="0"/>
+          </a:p>
+        </p:txBody>
+      </p:sp>
+      <p:sp>
+        <p:nvSpPr>
+          <p:cNvPr id="100" name="주간 진행 사항…"/>
+          <p:cNvSpPr txBox="1">
+            <a:spLocks noGrp="1"/>
+          </p:cNvSpPr>
+          <p:nvPr>
+            <p:ph type="body" idx="1"/>
+          </p:nvPr>
+        </p:nvSpPr>
+        <p:spPr>
+          <a:xfrm>
+            <a:off x="695403" y="1836606"/>
+            <a:ext cx="11057983" cy="1754087"/>
+          </a:xfrm>
+          <a:prstGeom prst="rect">
+            <a:avLst/>
+          </a:prstGeom>
+        </p:spPr>
+        <p:txBody>
+          <a:bodyPr>
+            <a:normAutofit/>
+          </a:bodyPr>
+          <a:lstStyle/>
+          <a:p>
+            <a:pPr fontAlgn="base"/>
+            <a:r>
+              <a:rPr lang="en-US" altLang="ko-KR" dirty="0"/>
+              <a:t>Dogs vs. Cats </a:t>
+            </a:r>
+            <a:r>
+              <a:rPr lang="en-US" altLang="ko-KR" dirty="0" err="1"/>
+              <a:t>Redux</a:t>
+            </a:r>
+            <a:r>
+              <a:rPr lang="en-US" altLang="ko-KR" dirty="0"/>
+              <a:t>: Kernels </a:t>
+            </a:r>
+            <a:r>
+              <a:rPr lang="en-US" altLang="ko-KR" dirty="0" smtClean="0"/>
+              <a:t>Edition</a:t>
+            </a:r>
+          </a:p>
+          <a:p>
+            <a:pPr lvl="1" fontAlgn="base"/>
+            <a:r>
+              <a:rPr lang="en-US" altLang="ko-KR" dirty="0">
+                <a:hlinkClick r:id="rId2"/>
+              </a:rPr>
+              <a:t>https://www.kaggle.com/c/dogs-vs-cats-redux-kernels-edition/</a:t>
+            </a:r>
+            <a:endParaRPr lang="en-US" altLang="ko-KR" dirty="0"/>
+          </a:p>
+        </p:txBody>
+      </p:sp>
+      <p:sp>
+        <p:nvSpPr>
+          <p:cNvPr id="101" name="Slide Number"/>
+          <p:cNvSpPr txBox="1">
+            <a:spLocks noGrp="1"/>
+          </p:cNvSpPr>
+          <p:nvPr>
+            <p:ph type="sldNum" sz="quarter" idx="2"/>
+          </p:nvPr>
+        </p:nvSpPr>
+        <p:spPr>
+          <a:prstGeom prst="rect">
+            <a:avLst/>
+          </a:prstGeom>
+          <a:extLst>
+            <a:ext uri="{C572A759-6A51-4108-AA02-DFA0A04FC94B}">
+              <ma14:wrappingTextBoxFlag xmlns="" xmlns:m="http://schemas.openxmlformats.org/officeDocument/2006/math" xmlns:a14="http://schemas.microsoft.com/office/drawing/2010/main" xmlns:ma14="http://schemas.microsoft.com/office/mac/drawingml/2011/main" val="1"/>
+            </a:ext>
+          </a:extLst>
+        </p:spPr>
+        <p:txBody>
+          <a:bodyPr/>
+          <a:lstStyle/>
+          <a:p>
+            <a:fld id="{86CB4B4D-7CA3-9044-876B-883B54F8677D}" type="slidenum">
+              <a:t>13</a:t>
+            </a:fld>
+            <a:endParaRPr/>
+          </a:p>
+        </p:txBody>
+      </p:sp>
+      <p:pic>
+        <p:nvPicPr>
+          <p:cNvPr id="3" name="Picture 2"/>
+          <p:cNvPicPr>
+            <a:picLocks noChangeAspect="1"/>
+          </p:cNvPicPr>
+          <p:nvPr/>
+        </p:nvPicPr>
+        <p:blipFill>
+          <a:blip r:embed="rId3"/>
+          <a:stretch>
+            <a:fillRect/>
+          </a:stretch>
+        </p:blipFill>
+        <p:spPr>
+          <a:xfrm>
+            <a:off x="1987898" y="4082276"/>
+            <a:ext cx="8315325" cy="3886200"/>
+          </a:xfrm>
+          <a:prstGeom prst="rect">
+            <a:avLst/>
+          </a:prstGeom>
+        </p:spPr>
+      </p:pic>
+    </p:spTree>
+    <p:extLst>
+      <p:ext uri="{BB962C8B-B14F-4D97-AF65-F5344CB8AC3E}">
+        <p14:creationId xmlns:p14="http://schemas.microsoft.com/office/powerpoint/2010/main" val="2015807442"/>
+      </p:ext>
+    </p:extLst>
+  </p:cSld>
+  <p:clrMapOvr>
+    <a:masterClrMapping/>
+  </p:clrMapOvr>
+  <p:transition spd="med"/>
+  <p:timing>
+    <p:tnLst>
+      <p:par>
+        <p:cTn id="1" dur="indefinite" restart="never" nodeType="tmRoot"/>
+      </p:par>
+    </p:tnLst>
+  </p:timing>
+</p:sld>
+</file>
+
+<file path=ppt/slides/slide14.xml><?xml version="1.0" encoding="utf-8"?>
+<p:sld xmlns:a="http://schemas.openxmlformats.org/drawingml/2006/main" xmlns:r="http://schemas.openxmlformats.org/officeDocument/2006/relationships" xmlns:p="http://schemas.openxmlformats.org/presentationml/2006/main">
+  <p:cSld>
+    <p:spTree>
+      <p:nvGrpSpPr>
+        <p:cNvPr id="1" name=""/>
+        <p:cNvGrpSpPr/>
+        <p:nvPr/>
+      </p:nvGrpSpPr>
+      <p:grpSpPr>
+        <a:xfrm>
+          <a:off x="0" y="0"/>
+          <a:ext cx="0" cy="0"/>
+          <a:chOff x="0" y="0"/>
+          <a:chExt cx="0" cy="0"/>
+        </a:xfrm>
+      </p:grpSpPr>
+      <p:sp>
+        <p:nvSpPr>
+          <p:cNvPr id="99" name="Current Status"/>
+          <p:cNvSpPr txBox="1">
+            <a:spLocks noGrp="1"/>
+          </p:cNvSpPr>
+          <p:nvPr>
+            <p:ph type="title"/>
+          </p:nvPr>
+        </p:nvSpPr>
+        <p:spPr>
+          <a:xfrm>
+            <a:off x="463550" y="254000"/>
+            <a:ext cx="12077700" cy="1798320"/>
+          </a:xfrm>
+          <a:prstGeom prst="rect">
+            <a:avLst/>
+          </a:prstGeom>
+        </p:spPr>
+        <p:txBody>
+          <a:bodyPr>
+            <a:normAutofit/>
+          </a:bodyPr>
+          <a:lstStyle/>
+          <a:p>
+            <a:pPr latinLnBrk="1"/>
+            <a:r>
+              <a:rPr lang="en-US" altLang="ko-KR" dirty="0" smtClean="0"/>
+              <a:t>Patent Idea </a:t>
+            </a:r>
+            <a:r>
+              <a:rPr lang="en-US" altLang="ko-KR" dirty="0" smtClean="0">
+                <a:solidFill>
+                  <a:srgbClr val="FF0000"/>
+                </a:solidFill>
+              </a:rPr>
+              <a:t>(Not Publicly Available)</a:t>
+            </a:r>
+            <a:endParaRPr lang="ko-KR" altLang="ko-KR" dirty="0">
+              <a:solidFill>
+                <a:srgbClr val="FF0000"/>
+              </a:solidFill>
+            </a:endParaRPr>
+          </a:p>
+        </p:txBody>
+      </p:sp>
+      <p:sp>
+        <p:nvSpPr>
+          <p:cNvPr id="100" name="주간 진행 사항…"/>
+          <p:cNvSpPr txBox="1">
+            <a:spLocks noGrp="1"/>
+          </p:cNvSpPr>
+          <p:nvPr>
+            <p:ph type="body" idx="1"/>
+          </p:nvPr>
+        </p:nvSpPr>
+        <p:spPr>
+          <a:xfrm>
+            <a:off x="673100" y="2479042"/>
+            <a:ext cx="11057983" cy="1000138"/>
+          </a:xfrm>
+          <a:prstGeom prst="rect">
+            <a:avLst/>
+          </a:prstGeom>
+        </p:spPr>
+        <p:txBody>
+          <a:bodyPr/>
+          <a:lstStyle/>
+          <a:p>
+            <a:pPr fontAlgn="base"/>
+            <a:r>
+              <a:rPr lang="en-US" altLang="ko-KR" dirty="0" smtClean="0">
+                <a:solidFill>
+                  <a:srgbClr val="FF0000"/>
+                </a:solidFill>
+              </a:rPr>
+              <a:t>NOT PUBLICLY AVAILABLE</a:t>
+            </a:r>
+          </a:p>
+        </p:txBody>
+      </p:sp>
+      <p:sp>
+        <p:nvSpPr>
+          <p:cNvPr id="101" name="Slide Number"/>
+          <p:cNvSpPr txBox="1">
+            <a:spLocks noGrp="1"/>
+          </p:cNvSpPr>
+          <p:nvPr>
+            <p:ph type="sldNum" sz="quarter" idx="2"/>
+          </p:nvPr>
+        </p:nvSpPr>
+        <p:spPr>
+          <a:prstGeom prst="rect">
+            <a:avLst/>
+          </a:prstGeom>
+          <a:extLst>
+            <a:ext uri="{C572A759-6A51-4108-AA02-DFA0A04FC94B}">
+              <ma14:wrappingTextBoxFlag xmlns="" xmlns:m="http://schemas.openxmlformats.org/officeDocument/2006/math" xmlns:a14="http://schemas.microsoft.com/office/drawing/2010/main" xmlns:ma14="http://schemas.microsoft.com/office/mac/drawingml/2011/main" val="1"/>
+            </a:ext>
+          </a:extLst>
+        </p:spPr>
+        <p:txBody>
+          <a:bodyPr/>
+          <a:lstStyle/>
+          <a:p>
+            <a:fld id="{86CB4B4D-7CA3-9044-876B-883B54F8677D}" type="slidenum">
+              <a:t>14</a:t>
+            </a:fld>
+            <a:endParaRPr/>
+          </a:p>
+        </p:txBody>
+      </p:sp>
+    </p:spTree>
+    <p:extLst>
+      <p:ext uri="{BB962C8B-B14F-4D97-AF65-F5344CB8AC3E}">
+        <p14:creationId xmlns:p14="http://schemas.microsoft.com/office/powerpoint/2010/main" val="2927059898"/>
+      </p:ext>
+    </p:extLst>
+  </p:cSld>
+  <p:clrMapOvr>
+    <a:masterClrMapping/>
+  </p:clrMapOvr>
+  <p:transition spd="med"/>
+  <p:timing>
+    <p:tnLst>
+      <p:par>
+        <p:cTn id="1" dur="indefinite" restart="never" nodeType="tmRoot"/>
+      </p:par>
+    </p:tnLst>
+  </p:timing>
+</p:sld>
+</file>
+
+<file path=ppt/slides/slide15.xml><?xml version="1.0" encoding="utf-8"?>
+<p:sld xmlns:a="http://schemas.openxmlformats.org/drawingml/2006/main" xmlns:r="http://schemas.openxmlformats.org/officeDocument/2006/relationships" xmlns:p="http://schemas.openxmlformats.org/presentationml/2006/main">
+  <p:cSld>
+    <p:spTree>
+      <p:nvGrpSpPr>
+        <p:cNvPr id="1" name=""/>
+        <p:cNvGrpSpPr/>
+        <p:nvPr/>
+      </p:nvGrpSpPr>
+      <p:grpSpPr>
+        <a:xfrm>
+          <a:off x="0" y="0"/>
+          <a:ext cx="0" cy="0"/>
+          <a:chOff x="0" y="0"/>
+          <a:chExt cx="0" cy="0"/>
+        </a:xfrm>
+      </p:grpSpPr>
+      <p:sp>
+        <p:nvSpPr>
           <p:cNvPr id="107" name="To do"/>
           <p:cNvSpPr txBox="1">
             <a:spLocks noGrp="1"/>
@@ -3864,7 +5460,7 @@
           </a:prstGeom>
           <a:extLst>
             <a:ext uri="{C572A759-6A51-4108-AA02-DFA0A04FC94B}">
-              <ma14:wrappingTextBoxFlag xmlns:ma14="http://schemas.microsoft.com/office/mac/drawingml/2011/main" xmlns:a14="http://schemas.microsoft.com/office/drawing/2010/main" xmlns:m="http://schemas.openxmlformats.org/officeDocument/2006/math" xmlns="" val="1"/>
+              <ma14:wrappingTextBoxFlag xmlns="" xmlns:m="http://schemas.openxmlformats.org/officeDocument/2006/math" xmlns:a14="http://schemas.microsoft.com/office/drawing/2010/main" xmlns:ma14="http://schemas.microsoft.com/office/mac/drawingml/2011/main" val="1"/>
             </a:ext>
           </a:extLst>
         </p:spPr>
@@ -3873,7 +5469,7 @@
           <a:lstStyle/>
           <a:p>
             <a:fld id="{86CB4B4D-7CA3-9044-876B-883B54F8677D}" type="slidenum">
-              <a:t>11</a:t>
+              <a:t>15</a:t>
             </a:fld>
             <a:endParaRPr/>
           </a:p>
@@ -4045,11 +5641,6 @@
               </a:rPr>
               <a:t>)</a:t>
             </a:r>
-            <a:endParaRPr lang="en-US" altLang="ko-KR" dirty="0" smtClean="0">
-              <a:solidFill>
-                <a:srgbClr val="FF0000"/>
-              </a:solidFill>
-            </a:endParaRPr>
           </a:p>
         </p:txBody>
       </p:sp>
@@ -4251,11 +5842,6 @@
               </a:rPr>
               <a:t>)</a:t>
             </a:r>
-            <a:endParaRPr lang="en-US" altLang="ko-KR" dirty="0" smtClean="0">
-              <a:solidFill>
-                <a:srgbClr val="FF0000"/>
-              </a:solidFill>
-            </a:endParaRPr>
           </a:p>
         </p:txBody>
       </p:sp>
@@ -4275,7 +5861,7 @@
           </a:prstGeom>
           <a:extLst>
             <a:ext uri="{C572A759-6A51-4108-AA02-DFA0A04FC94B}">
-              <ma14:wrappingTextBoxFlag xmlns:ma14="http://schemas.microsoft.com/office/mac/drawingml/2011/main" xmlns:a14="http://schemas.microsoft.com/office/drawing/2010/main" xmlns:m="http://schemas.openxmlformats.org/officeDocument/2006/math" xmlns="" val="1"/>
+              <ma14:wrappingTextBoxFlag xmlns="" xmlns:m="http://schemas.openxmlformats.org/officeDocument/2006/math" xmlns:a14="http://schemas.microsoft.com/office/drawing/2010/main" xmlns:ma14="http://schemas.microsoft.com/office/mac/drawingml/2011/main" val="1"/>
             </a:ext>
           </a:extLst>
         </p:spPr>
@@ -4600,15 +6186,7 @@
                   <a:srgbClr val="0000FF"/>
                 </a:solidFill>
               </a:rPr>
-              <a:t>~Y(</a:t>
-            </a:r>
-            <a:r>
-              <a:rPr lang="en-US" altLang="ko-KR" b="1" dirty="0" smtClean="0">
-                <a:solidFill>
-                  <a:srgbClr val="0000FF"/>
-                </a:solidFill>
-              </a:rPr>
-              <a:t>not Y)</a:t>
+              <a:t>~Y(not Y)</a:t>
             </a:r>
             <a:r>
               <a:rPr lang="ko-KR" altLang="en-US" dirty="0" smtClean="0">
@@ -4661,7 +6239,7 @@
           </a:prstGeom>
           <a:extLst>
             <a:ext uri="{C572A759-6A51-4108-AA02-DFA0A04FC94B}">
-              <ma14:wrappingTextBoxFlag xmlns:ma14="http://schemas.microsoft.com/office/mac/drawingml/2011/main" xmlns:a14="http://schemas.microsoft.com/office/drawing/2010/main" xmlns:m="http://schemas.openxmlformats.org/officeDocument/2006/math" xmlns="" val="1"/>
+              <ma14:wrappingTextBoxFlag xmlns="" xmlns:m="http://schemas.openxmlformats.org/officeDocument/2006/math" xmlns:a14="http://schemas.microsoft.com/office/drawing/2010/main" xmlns:ma14="http://schemas.microsoft.com/office/mac/drawingml/2011/main" val="1"/>
             </a:ext>
           </a:extLst>
         </p:spPr>
@@ -4734,11 +6312,7 @@
             </a:pPr>
             <a:r>
               <a:rPr lang="en-US" altLang="ko-KR" dirty="0" smtClean="0"/>
-              <a:t>[Y] = P(Y)*P(X1=x1|Y)*P(X2=x2|Y)*…*</a:t>
-            </a:r>
-            <a:r>
-              <a:rPr lang="en-US" altLang="ko-KR" dirty="0" smtClean="0"/>
-              <a:t>P(</a:t>
+              <a:t>[Y] = P(Y)*P(X1=x1|Y)*P(X2=x2|Y)*…*P(</a:t>
             </a:r>
             <a:r>
               <a:rPr lang="en-US" altLang="ko-KR" dirty="0" err="1" smtClean="0"/>
@@ -5006,7 +6580,7 @@
           </a:prstGeom>
           <a:extLst>
             <a:ext uri="{C572A759-6A51-4108-AA02-DFA0A04FC94B}">
-              <ma14:wrappingTextBoxFlag xmlns:ma14="http://schemas.microsoft.com/office/mac/drawingml/2011/main" xmlns:a14="http://schemas.microsoft.com/office/drawing/2010/main" xmlns:m="http://schemas.openxmlformats.org/officeDocument/2006/math" xmlns="" val="1"/>
+              <ma14:wrappingTextBoxFlag xmlns="" xmlns:m="http://schemas.openxmlformats.org/officeDocument/2006/math" xmlns:a14="http://schemas.microsoft.com/office/drawing/2010/main" xmlns:ma14="http://schemas.microsoft.com/office/mac/drawingml/2011/main" val="1"/>
             </a:ext>
           </a:extLst>
         </p:spPr>
@@ -5264,7 +6838,7 @@
           </a:prstGeom>
           <a:extLst>
             <a:ext uri="{C572A759-6A51-4108-AA02-DFA0A04FC94B}">
-              <ma14:wrappingTextBoxFlag xmlns:ma14="http://schemas.microsoft.com/office/mac/drawingml/2011/main" xmlns:a14="http://schemas.microsoft.com/office/drawing/2010/main" xmlns:m="http://schemas.openxmlformats.org/officeDocument/2006/math" xmlns="" val="1"/>
+              <ma14:wrappingTextBoxFlag xmlns="" xmlns:m="http://schemas.openxmlformats.org/officeDocument/2006/math" xmlns:a14="http://schemas.microsoft.com/office/drawing/2010/main" xmlns:ma14="http://schemas.microsoft.com/office/mac/drawingml/2011/main" val="1"/>
             </a:ext>
           </a:extLst>
         </p:spPr>
@@ -5605,7 +7179,7 @@
           </a:prstGeom>
           <a:extLst>
             <a:ext uri="{C572A759-6A51-4108-AA02-DFA0A04FC94B}">
-              <ma14:wrappingTextBoxFlag xmlns:ma14="http://schemas.microsoft.com/office/mac/drawingml/2011/main" xmlns:a14="http://schemas.microsoft.com/office/drawing/2010/main" xmlns:m="http://schemas.openxmlformats.org/officeDocument/2006/math" xmlns="" val="1"/>
+              <ma14:wrappingTextBoxFlag xmlns="" xmlns:m="http://schemas.openxmlformats.org/officeDocument/2006/math" xmlns:a14="http://schemas.microsoft.com/office/drawing/2010/main" xmlns:ma14="http://schemas.microsoft.com/office/mac/drawingml/2011/main" val="1"/>
             </a:ext>
           </a:extLst>
         </p:spPr>
@@ -6747,7 +8321,7 @@
           </a:prstGeom>
           <a:extLst>
             <a:ext uri="{C572A759-6A51-4108-AA02-DFA0A04FC94B}">
-              <ma14:wrappingTextBoxFlag xmlns:ma14="http://schemas.microsoft.com/office/mac/drawingml/2011/main" xmlns:a14="http://schemas.microsoft.com/office/drawing/2010/main" xmlns:m="http://schemas.openxmlformats.org/officeDocument/2006/math" xmlns="" val="1"/>
+              <ma14:wrappingTextBoxFlag xmlns="" xmlns:m="http://schemas.openxmlformats.org/officeDocument/2006/math" xmlns:a14="http://schemas.microsoft.com/office/drawing/2010/main" xmlns:ma14="http://schemas.microsoft.com/office/mac/drawingml/2011/main" val="1"/>
             </a:ext>
           </a:extLst>
         </p:spPr>
@@ -7700,8 +9274,8 @@
         </p:nvSpPr>
         <p:spPr>
           <a:xfrm>
-            <a:off x="673100" y="2479042"/>
-            <a:ext cx="11057983" cy="1000138"/>
+            <a:off x="695403" y="1836606"/>
+            <a:ext cx="11057983" cy="1586817"/>
           </a:xfrm>
           <a:prstGeom prst="rect">
             <a:avLst/>
@@ -7718,11 +9292,62 @@
                   <a:schemeClr val="tx1"/>
                 </a:solidFill>
               </a:rPr>
-              <a:t>Don’t Get Kicked</a:t>
+              <a:t>Don’t Get </a:t>
+            </a:r>
+            <a:r>
+              <a:rPr lang="en-US" altLang="ko-KR" dirty="0" smtClean="0">
+                <a:solidFill>
+                  <a:schemeClr val="tx1"/>
+                </a:solidFill>
+              </a:rPr>
+              <a:t>Kicked</a:t>
+            </a:r>
+          </a:p>
+          <a:p>
+            <a:pPr lvl="1" fontAlgn="base"/>
+            <a:r>
+              <a:rPr lang="ko-KR" altLang="en-US" dirty="0" smtClean="0">
+                <a:solidFill>
+                  <a:schemeClr val="tx1"/>
+                </a:solidFill>
+              </a:rPr>
+              <a:t>딥러닝 이용</a:t>
+            </a:r>
+            <a:r>
+              <a:rPr lang="en-US" altLang="ko-KR" dirty="0">
+                <a:solidFill>
+                  <a:schemeClr val="tx1"/>
+                </a:solidFill>
+              </a:rPr>
+              <a:t> </a:t>
+            </a:r>
+            <a:r>
+              <a:rPr lang="en-US" altLang="ko-KR" dirty="0" smtClean="0">
+                <a:solidFill>
+                  <a:srgbClr val="FF0000"/>
+                </a:solidFill>
+              </a:rPr>
+              <a:t>(</a:t>
+            </a:r>
+            <a:r>
+              <a:rPr lang="ko-KR" altLang="en-US" dirty="0" smtClean="0">
+                <a:solidFill>
+                  <a:srgbClr val="FF0000"/>
+                </a:solidFill>
+              </a:rPr>
+              <a:t>학습 및 테스트 데이터 열 지정에 오류가 있음</a:t>
+            </a:r>
+            <a:r>
+              <a:rPr lang="en-US" altLang="ko-KR" dirty="0" smtClean="0">
+                <a:solidFill>
+                  <a:srgbClr val="FF0000"/>
+                </a:solidFill>
+              </a:rPr>
+              <a:t>)</a:t>
             </a:r>
             <a:endParaRPr lang="en-US" altLang="ko-KR" dirty="0" smtClean="0">
               <a:solidFill>
-                <a:schemeClr val="tx1"/>
+                <a:srgbClr val="FF0000"/>
               </a:solidFill>
             </a:endParaRPr>
           </a:p>
@@ -7744,7 +9369,7 @@
           </a:prstGeom>
           <a:extLst>
             <a:ext uri="{C572A759-6A51-4108-AA02-DFA0A04FC94B}">
-              <ma14:wrappingTextBoxFlag xmlns:ma14="http://schemas.microsoft.com/office/mac/drawingml/2011/main" xmlns:a14="http://schemas.microsoft.com/office/drawing/2010/main" xmlns:m="http://schemas.openxmlformats.org/officeDocument/2006/math" xmlns="" val="1"/>
+              <ma14:wrappingTextBoxFlag xmlns="" xmlns:m="http://schemas.openxmlformats.org/officeDocument/2006/math" xmlns:a14="http://schemas.microsoft.com/office/drawing/2010/main" xmlns:ma14="http://schemas.microsoft.com/office/mac/drawingml/2011/main" val="1"/>
             </a:ext>
           </a:extLst>
         </p:spPr>
@@ -7756,6 +9381,327 @@
               <a:t>9</a:t>
             </a:fld>
             <a:endParaRPr/>
+          </a:p>
+        </p:txBody>
+      </p:sp>
+      <p:pic>
+        <p:nvPicPr>
+          <p:cNvPr id="2" name="Picture 1"/>
+          <p:cNvPicPr>
+            <a:picLocks noChangeAspect="1"/>
+          </p:cNvPicPr>
+          <p:nvPr/>
+        </p:nvPicPr>
+        <p:blipFill>
+          <a:blip r:embed="rId2"/>
+          <a:stretch>
+            <a:fillRect/>
+          </a:stretch>
+        </p:blipFill>
+        <p:spPr>
+          <a:xfrm>
+            <a:off x="2464420" y="3300913"/>
+            <a:ext cx="7384280" cy="4388085"/>
+          </a:xfrm>
+          <a:prstGeom prst="rect">
+            <a:avLst/>
+          </a:prstGeom>
+        </p:spPr>
+      </p:pic>
+      <p:sp>
+        <p:nvSpPr>
+          <p:cNvPr id="3" name="Rectangle 2"/>
+          <p:cNvSpPr/>
+          <p:nvPr/>
+        </p:nvSpPr>
+        <p:spPr>
+          <a:xfrm>
+            <a:off x="6684485" y="6969512"/>
+            <a:ext cx="2575932" cy="423746"/>
+          </a:xfrm>
+          <a:prstGeom prst="rect">
+            <a:avLst/>
+          </a:prstGeom>
+          <a:noFill/>
+          <a:ln w="38100" cap="flat">
+            <a:solidFill>
+              <a:srgbClr val="FF0000"/>
+            </a:solidFill>
+            <a:miter lim="400000"/>
+          </a:ln>
+          <a:effectLst/>
+          <a:sp3d/>
+        </p:spPr>
+        <p:style>
+          <a:lnRef idx="0">
+            <a:scrgbClr r="0" g="0" b="0"/>
+          </a:lnRef>
+          <a:fillRef idx="0">
+            <a:scrgbClr r="0" g="0" b="0"/>
+          </a:fillRef>
+          <a:effectRef idx="0">
+            <a:scrgbClr r="0" g="0" b="0"/>
+          </a:effectRef>
+          <a:fontRef idx="none"/>
+        </p:style>
+        <p:txBody>
+          <a:bodyPr rot="0" spcFirstLastPara="1" vertOverflow="overflow" horzOverflow="overflow" vert="horz" wrap="square" lIns="50800" tIns="50800" rIns="50800" bIns="50800" numCol="1" spcCol="38100" rtlCol="0" anchor="ctr">
+            <a:spAutoFit/>
+          </a:bodyPr>
+          <a:lstStyle/>
+          <a:p>
+            <a:pPr marL="0" marR="0" indent="0" algn="ctr" defTabSz="584200" rtl="0" fontAlgn="auto" latinLnBrk="0" hangingPunct="0">
+              <a:lnSpc>
+                <a:spcPct val="100000"/>
+              </a:lnSpc>
+              <a:spcBef>
+                <a:spcPts val="0"/>
+              </a:spcBef>
+              <a:spcAft>
+                <a:spcPts val="0"/>
+              </a:spcAft>
+              <a:buClrTx/>
+              <a:buSzTx/>
+              <a:buFontTx/>
+              <a:buNone/>
+              <a:tabLst/>
+            </a:pPr>
+            <a:endParaRPr kumimoji="0" lang="ko-KR" altLang="en-US" sz="2200" b="0" i="0" u="none" strike="noStrike" cap="none" spc="0" normalizeH="0" baseline="0">
+              <a:ln>
+                <a:noFill/>
+              </a:ln>
+              <a:solidFill>
+                <a:srgbClr val="FFFFFF"/>
+              </a:solidFill>
+              <a:effectLst/>
+              <a:uFillTx/>
+              <a:latin typeface="+mn-lt"/>
+              <a:ea typeface="+mn-ea"/>
+              <a:cs typeface="+mn-cs"/>
+              <a:sym typeface="Helvetica Neue Medium"/>
+            </a:endParaRPr>
+          </a:p>
+        </p:txBody>
+      </p:sp>
+      <p:pic>
+        <p:nvPicPr>
+          <p:cNvPr id="11" name="Picture 10"/>
+          <p:cNvPicPr>
+            <a:picLocks noChangeAspect="1"/>
+          </p:cNvPicPr>
+          <p:nvPr/>
+        </p:nvPicPr>
+        <p:blipFill>
+          <a:blip r:embed="rId3"/>
+          <a:srcRect/>
+          <a:stretch>
+            <a:fillRect/>
+          </a:stretch>
+        </p:blipFill>
+        <p:spPr>
+          <a:xfrm>
+            <a:off x="836341" y="7868674"/>
+            <a:ext cx="10664012" cy="919705"/>
+          </a:xfrm>
+          <a:custGeom>
+            <a:avLst/>
+            <a:gdLst>
+              <a:gd name="connsiteX0" fmla="*/ 0 w 10664012"/>
+              <a:gd name="connsiteY0" fmla="*/ 0 h 919705"/>
+              <a:gd name="connsiteX1" fmla="*/ 1494265 w 10664012"/>
+              <a:gd name="connsiteY1" fmla="*/ 0 h 919705"/>
+              <a:gd name="connsiteX2" fmla="*/ 1494265 w 10664012"/>
+              <a:gd name="connsiteY2" fmla="*/ 762370 h 919705"/>
+              <a:gd name="connsiteX3" fmla="*/ 2085279 w 10664012"/>
+              <a:gd name="connsiteY3" fmla="*/ 762370 h 919705"/>
+              <a:gd name="connsiteX4" fmla="*/ 2085279 w 10664012"/>
+              <a:gd name="connsiteY4" fmla="*/ 0 h 919705"/>
+              <a:gd name="connsiteX5" fmla="*/ 10664012 w 10664012"/>
+              <a:gd name="connsiteY5" fmla="*/ 0 h 919705"/>
+              <a:gd name="connsiteX6" fmla="*/ 10664012 w 10664012"/>
+              <a:gd name="connsiteY6" fmla="*/ 919705 h 919705"/>
+              <a:gd name="connsiteX7" fmla="*/ 7727125 w 10664012"/>
+              <a:gd name="connsiteY7" fmla="*/ 919705 h 919705"/>
+              <a:gd name="connsiteX8" fmla="*/ 7727125 w 10664012"/>
+              <a:gd name="connsiteY8" fmla="*/ 459852 h 919705"/>
+              <a:gd name="connsiteX9" fmla="*/ 7136110 w 10664012"/>
+              <a:gd name="connsiteY9" fmla="*/ 459852 h 919705"/>
+              <a:gd name="connsiteX10" fmla="*/ 7136110 w 10664012"/>
+              <a:gd name="connsiteY10" fmla="*/ 919705 h 919705"/>
+              <a:gd name="connsiteX11" fmla="*/ 0 w 10664012"/>
+              <a:gd name="connsiteY11" fmla="*/ 919705 h 919705"/>
+            </a:gdLst>
+            <a:ahLst/>
+            <a:cxnLst>
+              <a:cxn ang="0">
+                <a:pos x="connsiteX0" y="connsiteY0"/>
+              </a:cxn>
+              <a:cxn ang="0">
+                <a:pos x="connsiteX1" y="connsiteY1"/>
+              </a:cxn>
+              <a:cxn ang="0">
+                <a:pos x="connsiteX2" y="connsiteY2"/>
+              </a:cxn>
+              <a:cxn ang="0">
+                <a:pos x="connsiteX3" y="connsiteY3"/>
+              </a:cxn>
+              <a:cxn ang="0">
+                <a:pos x="connsiteX4" y="connsiteY4"/>
+              </a:cxn>
+              <a:cxn ang="0">
+                <a:pos x="connsiteX5" y="connsiteY5"/>
+              </a:cxn>
+              <a:cxn ang="0">
+                <a:pos x="connsiteX6" y="connsiteY6"/>
+              </a:cxn>
+              <a:cxn ang="0">
+                <a:pos x="connsiteX7" y="connsiteY7"/>
+              </a:cxn>
+              <a:cxn ang="0">
+                <a:pos x="connsiteX8" y="connsiteY8"/>
+              </a:cxn>
+              <a:cxn ang="0">
+                <a:pos x="connsiteX9" y="connsiteY9"/>
+              </a:cxn>
+              <a:cxn ang="0">
+                <a:pos x="connsiteX10" y="connsiteY10"/>
+              </a:cxn>
+              <a:cxn ang="0">
+                <a:pos x="connsiteX11" y="connsiteY11"/>
+              </a:cxn>
+            </a:cxnLst>
+            <a:rect l="l" t="t" r="r" b="b"/>
+            <a:pathLst>
+              <a:path w="10664012" h="919705">
+                <a:moveTo>
+                  <a:pt x="0" y="0"/>
+                </a:moveTo>
+                <a:lnTo>
+                  <a:pt x="1494265" y="0"/>
+                </a:lnTo>
+                <a:lnTo>
+                  <a:pt x="1494265" y="762370"/>
+                </a:lnTo>
+                <a:lnTo>
+                  <a:pt x="2085279" y="762370"/>
+                </a:lnTo>
+                <a:lnTo>
+                  <a:pt x="2085279" y="0"/>
+                </a:lnTo>
+                <a:lnTo>
+                  <a:pt x="10664012" y="0"/>
+                </a:lnTo>
+                <a:lnTo>
+                  <a:pt x="10664012" y="919705"/>
+                </a:lnTo>
+                <a:lnTo>
+                  <a:pt x="7727125" y="919705"/>
+                </a:lnTo>
+                <a:lnTo>
+                  <a:pt x="7727125" y="459852"/>
+                </a:lnTo>
+                <a:lnTo>
+                  <a:pt x="7136110" y="459852"/>
+                </a:lnTo>
+                <a:lnTo>
+                  <a:pt x="7136110" y="919705"/>
+                </a:lnTo>
+                <a:lnTo>
+                  <a:pt x="0" y="919705"/>
+                </a:lnTo>
+                <a:close/>
+              </a:path>
+            </a:pathLst>
+          </a:custGeom>
+        </p:spPr>
+      </p:pic>
+      <p:sp>
+        <p:nvSpPr>
+          <p:cNvPr id="6" name="TextBox 5"/>
+          <p:cNvSpPr txBox="1"/>
+          <p:nvPr/>
+        </p:nvSpPr>
+        <p:spPr>
+          <a:xfrm>
+            <a:off x="695403" y="8496131"/>
+            <a:ext cx="771045" cy="471924"/>
+          </a:xfrm>
+          <a:prstGeom prst="rect">
+            <a:avLst/>
+          </a:prstGeom>
+          <a:noFill/>
+          <a:ln w="12700" cap="flat">
+            <a:noFill/>
+            <a:miter lim="400000"/>
+          </a:ln>
+          <a:effectLst/>
+          <a:sp3d/>
+        </p:spPr>
+        <p:style>
+          <a:lnRef idx="0">
+            <a:scrgbClr r="0" g="0" b="0"/>
+          </a:lnRef>
+          <a:fillRef idx="0">
+            <a:scrgbClr r="0" g="0" b="0"/>
+          </a:fillRef>
+          <a:effectRef idx="0">
+            <a:scrgbClr r="0" g="0" b="0"/>
+          </a:effectRef>
+          <a:fontRef idx="none"/>
+        </p:style>
+        <p:txBody>
+          <a:bodyPr rot="0" spcFirstLastPara="1" vertOverflow="overflow" horzOverflow="overflow" vert="horz" wrap="none" lIns="50800" tIns="50800" rIns="50800" bIns="50800" numCol="1" spcCol="38100" rtlCol="0" anchor="ctr">
+            <a:spAutoFit/>
+          </a:bodyPr>
+          <a:lstStyle/>
+          <a:p>
+            <a:pPr marL="0" marR="0" indent="0" algn="ctr" defTabSz="584200" rtl="0" fontAlgn="auto" latinLnBrk="0" hangingPunct="0">
+              <a:lnSpc>
+                <a:spcPct val="100000"/>
+              </a:lnSpc>
+              <a:spcBef>
+                <a:spcPts val="0"/>
+              </a:spcBef>
+              <a:spcAft>
+                <a:spcPts val="0"/>
+              </a:spcAft>
+              <a:buClrTx/>
+              <a:buSzTx/>
+              <a:buFontTx/>
+              <a:buNone/>
+              <a:tabLst/>
+            </a:pPr>
+            <a:r>
+              <a:rPr kumimoji="0" lang="en-US" altLang="ko-KR" sz="2400" b="1" i="0" u="none" strike="noStrike" cap="none" spc="0" normalizeH="0" baseline="0" dirty="0" smtClean="0">
+                <a:ln>
+                  <a:noFill/>
+                </a:ln>
+                <a:solidFill>
+                  <a:srgbClr val="FF0000"/>
+                </a:solidFill>
+                <a:effectLst/>
+                <a:uFillTx/>
+                <a:latin typeface="Helvetica Neue"/>
+                <a:ea typeface="Helvetica Neue"/>
+                <a:cs typeface="Helvetica Neue"/>
+                <a:sym typeface="Helvetica Neue"/>
+              </a:rPr>
+              <a:t>/570</a:t>
+            </a:r>
+            <a:endParaRPr kumimoji="0" lang="ko-KR" altLang="en-US" sz="2400" b="1" i="0" u="none" strike="noStrike" cap="none" spc="0" normalizeH="0" baseline="0" dirty="0">
+              <a:ln>
+                <a:noFill/>
+              </a:ln>
+              <a:solidFill>
+                <a:srgbClr val="FF0000"/>
+              </a:solidFill>
+              <a:effectLst/>
+              <a:uFillTx/>
+              <a:latin typeface="Helvetica Neue"/>
+              <a:ea typeface="Helvetica Neue"/>
+              <a:cs typeface="Helvetica Neue"/>
+              <a:sym typeface="Helvetica Neue"/>
+            </a:endParaRPr>
           </a:p>
         </p:txBody>
       </p:sp>

</xml_diff>